<commit_message>
Template + Version update
</commit_message>
<xml_diff>
--- a/inst/templates/TemplateIQ_169.pptx
+++ b/inst/templates/TemplateIQ_169.pptx
@@ -1,11 +1,39 @@
 
 <file path=ppt/presentation.xml><?xml version="1.0" encoding="utf-8"?>
-<p:presentation xmlns:a="http://schemas.openxmlformats.org/drawingml/2006/main" xmlns:r="http://schemas.openxmlformats.org/officeDocument/2006/relationships" xmlns:p="http://schemas.openxmlformats.org/presentationml/2006/main" saveSubsetFonts="1">
+<p:presentation xmlns:a="http://schemas.openxmlformats.org/drawingml/2006/main" xmlns:r="http://schemas.openxmlformats.org/officeDocument/2006/relationships" xmlns:p="http://schemas.openxmlformats.org/presentationml/2006/main" showSpecialPlsOnTitleSld="0" embedTrueTypeFonts="1">
   <p:sldMasterIdLst>
     <p:sldMasterId id="2147483648" r:id="rId1"/>
   </p:sldMasterIdLst>
+  <p:notesMasterIdLst>
+    <p:notesMasterId r:id="rId2"/>
+  </p:notesMasterIdLst>
   <p:sldSz cx="12192000" cy="6858000"/>
   <p:notesSz cx="6858000" cy="9144000"/>
+  <p:embeddedFontLst>
+    <p:embeddedFont>
+      <p:font typeface="Calibri" panose="020F0502020204030204" pitchFamily="34" charset="0"/>
+      <p:regular r:id="rId3"/>
+      <p:bold r:id="rId4"/>
+      <p:italic r:id="rId5"/>
+      <p:boldItalic r:id="rId6"/>
+    </p:embeddedFont>
+    <p:embeddedFont>
+      <p:font typeface="Mont Heavy" panose="00000A00000000000000" pitchFamily="50" charset="0"/>
+      <p:bold r:id="rId7"/>
+    </p:embeddedFont>
+    <p:embeddedFont>
+      <p:font typeface="Mont Light" panose="00000500000000000000" pitchFamily="50" charset="0"/>
+      <p:regular r:id="rId8"/>
+    </p:embeddedFont>
+    <p:embeddedFont>
+      <p:font typeface="Mont Light" panose="00000500000000000000" pitchFamily="50" charset="0"/>
+      <p:regular r:id="rId8"/>
+    </p:embeddedFont>
+    <p:embeddedFont>
+      <p:font typeface="Open Sans" panose="020B0606030504020204" pitchFamily="34" charset="0"/>
+      <p:regular r:id="rId9"/>
+    </p:embeddedFont>
+  </p:embeddedFontLst>
   <p:defaultTextStyle>
     <a:defPPr>
       <a:defRPr lang="en-US"/>
@@ -109,6 +137,356 @@
 </p:presentation>
 </file>
 
+<file path=ppt/notesMasters/notesMaster1.xml><?xml version="1.0" encoding="utf-8"?>
+<p:notesMaster xmlns:a="http://schemas.openxmlformats.org/drawingml/2006/main" xmlns:r="http://schemas.openxmlformats.org/officeDocument/2006/relationships" xmlns:p="http://schemas.openxmlformats.org/presentationml/2006/main">
+  <p:cSld>
+    <p:bg>
+      <p:bgRef idx="1001">
+        <a:schemeClr val="bg1"/>
+      </p:bgRef>
+    </p:bg>
+    <p:spTree>
+      <p:nvGrpSpPr>
+        <p:cNvPr id="1" name=""/>
+        <p:cNvGrpSpPr/>
+        <p:nvPr/>
+      </p:nvGrpSpPr>
+      <p:grpSpPr>
+        <a:xfrm>
+          <a:off x="0" y="0"/>
+          <a:ext cx="0" cy="0"/>
+          <a:chOff x="0" y="0"/>
+          <a:chExt cx="0" cy="0"/>
+        </a:xfrm>
+      </p:grpSpPr>
+      <p:sp>
+        <p:nvSpPr>
+          <p:cNvPr id="2" name="Header Placeholder 1"/>
+          <p:cNvSpPr>
+            <a:spLocks noGrp="1"/>
+          </p:cNvSpPr>
+          <p:nvPr>
+            <p:ph type="hdr" sz="quarter"/>
+          </p:nvPr>
+        </p:nvSpPr>
+        <p:spPr>
+          <a:xfrm>
+            <a:off x="0" y="0"/>
+            <a:ext cx="2971800" cy="458788"/>
+          </a:xfrm>
+          <a:prstGeom prst="rect">
+            <a:avLst/>
+          </a:prstGeom>
+        </p:spPr>
+        <p:txBody>
+          <a:bodyPr vert="horz" lIns="91440" tIns="45720" rIns="91440" bIns="45720" rtlCol="0"/>
+          <a:lstStyle>
+            <a:lvl1pPr algn="l">
+              <a:defRPr sz="1200"/>
+            </a:lvl1pPr>
+          </a:lstStyle>
+          <a:p>
+            <a:endParaRPr lang="en-CH"/>
+          </a:p>
+        </p:txBody>
+      </p:sp>
+      <p:sp>
+        <p:nvSpPr>
+          <p:cNvPr id="3" name="Date Placeholder 2"/>
+          <p:cNvSpPr>
+            <a:spLocks noGrp="1"/>
+          </p:cNvSpPr>
+          <p:nvPr>
+            <p:ph type="dt" idx="1"/>
+          </p:nvPr>
+        </p:nvSpPr>
+        <p:spPr>
+          <a:xfrm>
+            <a:off x="3884613" y="0"/>
+            <a:ext cx="2971800" cy="458788"/>
+          </a:xfrm>
+          <a:prstGeom prst="rect">
+            <a:avLst/>
+          </a:prstGeom>
+        </p:spPr>
+        <p:txBody>
+          <a:bodyPr vert="horz" lIns="91440" tIns="45720" rIns="91440" bIns="45720" rtlCol="0"/>
+          <a:lstStyle>
+            <a:lvl1pPr algn="r">
+              <a:defRPr sz="1200"/>
+            </a:lvl1pPr>
+          </a:lstStyle>
+          <a:p>
+            <a:fld id="{A5878FE3-DB01-4D8B-94BE-F31B6ED9B2F4}" type="datetimeFigureOut">
+              <a:rPr lang="en-CH" smtClean="0"/>
+              <a:t>11/01/2021</a:t>
+            </a:fld>
+            <a:endParaRPr lang="en-CH"/>
+          </a:p>
+        </p:txBody>
+      </p:sp>
+      <p:sp>
+        <p:nvSpPr>
+          <p:cNvPr id="4" name="Slide Image Placeholder 3"/>
+          <p:cNvSpPr>
+            <a:spLocks noGrp="1" noRot="1" noChangeAspect="1"/>
+          </p:cNvSpPr>
+          <p:nvPr>
+            <p:ph type="sldImg" idx="2"/>
+          </p:nvPr>
+        </p:nvSpPr>
+        <p:spPr>
+          <a:xfrm>
+            <a:off x="685800" y="1143000"/>
+            <a:ext cx="5486400" cy="3086100"/>
+          </a:xfrm>
+          <a:prstGeom prst="rect">
+            <a:avLst/>
+          </a:prstGeom>
+          <a:noFill/>
+          <a:ln w="12700">
+            <a:solidFill>
+              <a:prstClr val="black"/>
+            </a:solidFill>
+          </a:ln>
+        </p:spPr>
+        <p:txBody>
+          <a:bodyPr vert="horz" lIns="91440" tIns="45720" rIns="91440" bIns="45720" rtlCol="0" anchor="ctr"/>
+          <a:lstStyle/>
+          <a:p>
+            <a:endParaRPr lang="en-CH"/>
+          </a:p>
+        </p:txBody>
+      </p:sp>
+      <p:sp>
+        <p:nvSpPr>
+          <p:cNvPr id="5" name="Notes Placeholder 4"/>
+          <p:cNvSpPr>
+            <a:spLocks noGrp="1"/>
+          </p:cNvSpPr>
+          <p:nvPr>
+            <p:ph type="body" sz="quarter" idx="3"/>
+          </p:nvPr>
+        </p:nvSpPr>
+        <p:spPr>
+          <a:xfrm>
+            <a:off x="685800" y="4400550"/>
+            <a:ext cx="5486400" cy="3600450"/>
+          </a:xfrm>
+          <a:prstGeom prst="rect">
+            <a:avLst/>
+          </a:prstGeom>
+        </p:spPr>
+        <p:txBody>
+          <a:bodyPr vert="horz" lIns="91440" tIns="45720" rIns="91440" bIns="45720" rtlCol="0"/>
+          <a:lstStyle/>
+          <a:p>
+            <a:pPr lvl="0"/>
+            <a:r>
+              <a:rPr lang="en-US"/>
+              <a:t>Click to edit Master text styles</a:t>
+            </a:r>
+          </a:p>
+          <a:p>
+            <a:pPr lvl="1"/>
+            <a:r>
+              <a:rPr lang="en-US"/>
+              <a:t>Second level</a:t>
+            </a:r>
+          </a:p>
+          <a:p>
+            <a:pPr lvl="2"/>
+            <a:r>
+              <a:rPr lang="en-US"/>
+              <a:t>Third level</a:t>
+            </a:r>
+          </a:p>
+          <a:p>
+            <a:pPr lvl="3"/>
+            <a:r>
+              <a:rPr lang="en-US"/>
+              <a:t>Fourth level</a:t>
+            </a:r>
+          </a:p>
+          <a:p>
+            <a:pPr lvl="4"/>
+            <a:r>
+              <a:rPr lang="en-US"/>
+              <a:t>Fifth level</a:t>
+            </a:r>
+            <a:endParaRPr lang="en-CH"/>
+          </a:p>
+        </p:txBody>
+      </p:sp>
+      <p:sp>
+        <p:nvSpPr>
+          <p:cNvPr id="6" name="Footer Placeholder 5"/>
+          <p:cNvSpPr>
+            <a:spLocks noGrp="1"/>
+          </p:cNvSpPr>
+          <p:nvPr>
+            <p:ph type="ftr" sz="quarter" idx="4"/>
+          </p:nvPr>
+        </p:nvSpPr>
+        <p:spPr>
+          <a:xfrm>
+            <a:off x="0" y="8685213"/>
+            <a:ext cx="2971800" cy="458787"/>
+          </a:xfrm>
+          <a:prstGeom prst="rect">
+            <a:avLst/>
+          </a:prstGeom>
+        </p:spPr>
+        <p:txBody>
+          <a:bodyPr vert="horz" lIns="91440" tIns="45720" rIns="91440" bIns="45720" rtlCol="0" anchor="b"/>
+          <a:lstStyle>
+            <a:lvl1pPr algn="l">
+              <a:defRPr sz="1200"/>
+            </a:lvl1pPr>
+          </a:lstStyle>
+          <a:p>
+            <a:endParaRPr lang="en-CH"/>
+          </a:p>
+        </p:txBody>
+      </p:sp>
+      <p:sp>
+        <p:nvSpPr>
+          <p:cNvPr id="7" name="Slide Number Placeholder 6"/>
+          <p:cNvSpPr>
+            <a:spLocks noGrp="1"/>
+          </p:cNvSpPr>
+          <p:nvPr>
+            <p:ph type="sldNum" sz="quarter" idx="5"/>
+          </p:nvPr>
+        </p:nvSpPr>
+        <p:spPr>
+          <a:xfrm>
+            <a:off x="3884613" y="8685213"/>
+            <a:ext cx="2971800" cy="458787"/>
+          </a:xfrm>
+          <a:prstGeom prst="rect">
+            <a:avLst/>
+          </a:prstGeom>
+        </p:spPr>
+        <p:txBody>
+          <a:bodyPr vert="horz" lIns="91440" tIns="45720" rIns="91440" bIns="45720" rtlCol="0" anchor="b"/>
+          <a:lstStyle>
+            <a:lvl1pPr algn="r">
+              <a:defRPr sz="1200"/>
+            </a:lvl1pPr>
+          </a:lstStyle>
+          <a:p>
+            <a:fld id="{CE058F61-52A3-4284-9341-9F7F1FB9AE77}" type="slidenum">
+              <a:rPr lang="en-CH" smtClean="0"/>
+              <a:t>‹#›</a:t>
+            </a:fld>
+            <a:endParaRPr lang="en-CH"/>
+          </a:p>
+        </p:txBody>
+      </p:sp>
+    </p:spTree>
+    <p:extLst>
+      <p:ext uri="{BB962C8B-B14F-4D97-AF65-F5344CB8AC3E}">
+        <p14:creationId xmlns:p14="http://schemas.microsoft.com/office/powerpoint/2010/main" val="4088289294"/>
+      </p:ext>
+    </p:extLst>
+  </p:cSld>
+  <p:clrMap bg1="lt1" tx1="dk1" bg2="lt2" tx2="dk2" accent1="accent1" accent2="accent2" accent3="accent3" accent4="accent4" accent5="accent5" accent6="accent6" hlink="hlink" folHlink="folHlink"/>
+  <p:notesStyle>
+    <a:lvl1pPr marL="0" algn="l" defTabSz="914400" rtl="0" eaLnBrk="1" latinLnBrk="0" hangingPunct="1">
+      <a:defRPr sz="1200" kern="1200">
+        <a:solidFill>
+          <a:schemeClr val="tx1"/>
+        </a:solidFill>
+        <a:latin typeface="+mn-lt"/>
+        <a:ea typeface="+mn-ea"/>
+        <a:cs typeface="+mn-cs"/>
+      </a:defRPr>
+    </a:lvl1pPr>
+    <a:lvl2pPr marL="457200" algn="l" defTabSz="914400" rtl="0" eaLnBrk="1" latinLnBrk="0" hangingPunct="1">
+      <a:defRPr sz="1200" kern="1200">
+        <a:solidFill>
+          <a:schemeClr val="tx1"/>
+        </a:solidFill>
+        <a:latin typeface="+mn-lt"/>
+        <a:ea typeface="+mn-ea"/>
+        <a:cs typeface="+mn-cs"/>
+      </a:defRPr>
+    </a:lvl2pPr>
+    <a:lvl3pPr marL="914400" algn="l" defTabSz="914400" rtl="0" eaLnBrk="1" latinLnBrk="0" hangingPunct="1">
+      <a:defRPr sz="1200" kern="1200">
+        <a:solidFill>
+          <a:schemeClr val="tx1"/>
+        </a:solidFill>
+        <a:latin typeface="+mn-lt"/>
+        <a:ea typeface="+mn-ea"/>
+        <a:cs typeface="+mn-cs"/>
+      </a:defRPr>
+    </a:lvl3pPr>
+    <a:lvl4pPr marL="1371600" algn="l" defTabSz="914400" rtl="0" eaLnBrk="1" latinLnBrk="0" hangingPunct="1">
+      <a:defRPr sz="1200" kern="1200">
+        <a:solidFill>
+          <a:schemeClr val="tx1"/>
+        </a:solidFill>
+        <a:latin typeface="+mn-lt"/>
+        <a:ea typeface="+mn-ea"/>
+        <a:cs typeface="+mn-cs"/>
+      </a:defRPr>
+    </a:lvl4pPr>
+    <a:lvl5pPr marL="1828800" algn="l" defTabSz="914400" rtl="0" eaLnBrk="1" latinLnBrk="0" hangingPunct="1">
+      <a:defRPr sz="1200" kern="1200">
+        <a:solidFill>
+          <a:schemeClr val="tx1"/>
+        </a:solidFill>
+        <a:latin typeface="+mn-lt"/>
+        <a:ea typeface="+mn-ea"/>
+        <a:cs typeface="+mn-cs"/>
+      </a:defRPr>
+    </a:lvl5pPr>
+    <a:lvl6pPr marL="2286000" algn="l" defTabSz="914400" rtl="0" eaLnBrk="1" latinLnBrk="0" hangingPunct="1">
+      <a:defRPr sz="1200" kern="1200">
+        <a:solidFill>
+          <a:schemeClr val="tx1"/>
+        </a:solidFill>
+        <a:latin typeface="+mn-lt"/>
+        <a:ea typeface="+mn-ea"/>
+        <a:cs typeface="+mn-cs"/>
+      </a:defRPr>
+    </a:lvl6pPr>
+    <a:lvl7pPr marL="2743200" algn="l" defTabSz="914400" rtl="0" eaLnBrk="1" latinLnBrk="0" hangingPunct="1">
+      <a:defRPr sz="1200" kern="1200">
+        <a:solidFill>
+          <a:schemeClr val="tx1"/>
+        </a:solidFill>
+        <a:latin typeface="+mn-lt"/>
+        <a:ea typeface="+mn-ea"/>
+        <a:cs typeface="+mn-cs"/>
+      </a:defRPr>
+    </a:lvl7pPr>
+    <a:lvl8pPr marL="3200400" algn="l" defTabSz="914400" rtl="0" eaLnBrk="1" latinLnBrk="0" hangingPunct="1">
+      <a:defRPr sz="1200" kern="1200">
+        <a:solidFill>
+          <a:schemeClr val="tx1"/>
+        </a:solidFill>
+        <a:latin typeface="+mn-lt"/>
+        <a:ea typeface="+mn-ea"/>
+        <a:cs typeface="+mn-cs"/>
+      </a:defRPr>
+    </a:lvl8pPr>
+    <a:lvl9pPr marL="3657600" algn="l" defTabSz="914400" rtl="0" eaLnBrk="1" latinLnBrk="0" hangingPunct="1">
+      <a:defRPr sz="1200" kern="1200">
+        <a:solidFill>
+          <a:schemeClr val="tx1"/>
+        </a:solidFill>
+        <a:latin typeface="+mn-lt"/>
+        <a:ea typeface="+mn-ea"/>
+        <a:cs typeface="+mn-cs"/>
+      </a:defRPr>
+    </a:lvl9pPr>
+  </p:notesStyle>
+</p:notesMaster>
+</file>
+
 <file path=ppt/slideLayouts/slideLayout1.xml><?xml version="1.0" encoding="utf-8"?>
 <p:sldLayout xmlns:a="http://schemas.openxmlformats.org/drawingml/2006/main" xmlns:r="http://schemas.openxmlformats.org/officeDocument/2006/relationships" xmlns:p="http://schemas.openxmlformats.org/presentationml/2006/main" type="title" preserve="1">
   <p:cSld name="Title Slide">
@@ -180,7 +558,7 @@
         <p:spPr>
           <a:xfrm>
             <a:off x="250521" y="1191716"/>
-            <a:ext cx="11636679" cy="1752600"/>
+            <a:ext cx="11636679" cy="1047631"/>
           </a:xfrm>
           <a:noFill/>
         </p:spPr>
@@ -223,7 +601,7 @@
         </p:nvSpPr>
         <p:spPr>
           <a:xfrm>
-            <a:off x="250521" y="3161651"/>
+            <a:off x="250521" y="2420484"/>
             <a:ext cx="11636679" cy="644842"/>
           </a:xfrm>
         </p:spPr>
@@ -301,7 +679,7 @@
           <a:bodyPr/>
           <a:lstStyle/>
           <a:p>
-            <a:fld id="{7B272C57-2FA0-4A9D-99A4-6F756B65018B}" type="datetimeFigureOut">
+            <a:fld id="{A94D35BA-A7CE-4DE4-BA4E-04DE13CAAB29}" type="datetime1">
               <a:rPr lang="en-US" smtClean="0"/>
               <a:t>1/11/2021</a:t>
             </a:fld>
@@ -593,7 +971,7 @@
           <a:bodyPr/>
           <a:lstStyle/>
           <a:p>
-            <a:fld id="{7B272C57-2FA0-4A9D-99A4-6F756B65018B}" type="datetimeFigureOut">
+            <a:fld id="{4FFDB71B-036A-4BEC-86F0-EDFEFDE2EF08}" type="datetime1">
               <a:rPr lang="en-US" smtClean="0"/>
               <a:t>1/11/2021</a:t>
             </a:fld>
@@ -706,7 +1084,7 @@
           <a:bodyPr/>
           <a:lstStyle/>
           <a:p>
-            <a:fld id="{7B272C57-2FA0-4A9D-99A4-6F756B65018B}" type="datetimeFigureOut">
+            <a:fld id="{1F05B7B7-0FF3-4A2C-AC43-F7175C6B92C9}" type="datetime1">
               <a:rPr lang="en-US" smtClean="0"/>
               <a:t>1/11/2021</a:t>
             </a:fld>
@@ -1017,7 +1395,7 @@
           <a:bodyPr/>
           <a:lstStyle/>
           <a:p>
-            <a:fld id="{7B272C57-2FA0-4A9D-99A4-6F756B65018B}" type="datetimeFigureOut">
+            <a:fld id="{A1B82BB3-4412-471D-9666-F484886DD79A}" type="datetime1">
               <a:rPr lang="en-US" smtClean="0"/>
               <a:t>1/11/2021</a:t>
             </a:fld>
@@ -1305,7 +1683,7 @@
           <a:bodyPr/>
           <a:lstStyle/>
           <a:p>
-            <a:fld id="{7B272C57-2FA0-4A9D-99A4-6F756B65018B}" type="datetimeFigureOut">
+            <a:fld id="{C7F460FB-AFF6-4091-BC6E-B2ACC5584478}" type="datetime1">
               <a:rPr lang="en-US" smtClean="0"/>
               <a:t>1/11/2021</a:t>
             </a:fld>
@@ -1503,7 +1881,7 @@
           <a:bodyPr/>
           <a:lstStyle/>
           <a:p>
-            <a:fld id="{7B272C57-2FA0-4A9D-99A4-6F756B65018B}" type="datetimeFigureOut">
+            <a:fld id="{9A020F0C-73CD-4F55-8075-41C6738BAAA7}" type="datetime1">
               <a:rPr lang="en-US" smtClean="0"/>
               <a:t>1/11/2021</a:t>
             </a:fld>
@@ -1711,7 +2089,7 @@
           <a:bodyPr/>
           <a:lstStyle/>
           <a:p>
-            <a:fld id="{7B272C57-2FA0-4A9D-99A4-6F756B65018B}" type="datetimeFigureOut">
+            <a:fld id="{B20BEDA7-737D-42F6-A80F-11BC05D68277}" type="datetime1">
               <a:rPr lang="en-US" smtClean="0"/>
               <a:t>1/11/2021</a:t>
             </a:fld>
@@ -1914,7 +2292,7 @@
           <a:bodyPr/>
           <a:lstStyle/>
           <a:p>
-            <a:fld id="{7B272C57-2FA0-4A9D-99A4-6F756B65018B}" type="datetimeFigureOut">
+            <a:fld id="{E2B48A43-9742-48CA-9491-6C2FDC78AC32}" type="datetime1">
               <a:rPr lang="en-US" smtClean="0"/>
               <a:t>1/11/2021</a:t>
             </a:fld>
@@ -2122,7 +2500,7 @@
           <a:bodyPr/>
           <a:lstStyle/>
           <a:p>
-            <a:fld id="{7B272C57-2FA0-4A9D-99A4-6F756B65018B}" type="datetimeFigureOut">
+            <a:fld id="{EBBF1247-5EB7-40A1-AFD7-5FD82AF1AAB3}" type="datetime1">
               <a:rPr lang="en-US" smtClean="0"/>
               <a:t>1/11/2021</a:t>
             </a:fld>
@@ -2483,7 +2861,7 @@
           <a:bodyPr/>
           <a:lstStyle/>
           <a:p>
-            <a:fld id="{7B272C57-2FA0-4A9D-99A4-6F756B65018B}" type="datetimeFigureOut">
+            <a:fld id="{73181174-1282-44A5-AC8B-21F286D386F9}" type="datetime1">
               <a:rPr lang="en-US" smtClean="0"/>
               <a:t>1/11/2021</a:t>
             </a:fld>
@@ -2604,7 +2982,7 @@
           <a:bodyPr/>
           <a:lstStyle/>
           <a:p>
-            <a:fld id="{7B272C57-2FA0-4A9D-99A4-6F756B65018B}" type="datetimeFigureOut">
+            <a:fld id="{037FCF08-CE9A-4644-A888-AE2F1DE5AE92}" type="datetime1">
               <a:rPr lang="en-US" smtClean="0"/>
               <a:t>1/11/2021</a:t>
             </a:fld>
@@ -2889,7 +3267,7 @@
           <a:bodyPr/>
           <a:lstStyle/>
           <a:p>
-            <a:fld id="{7B272C57-2FA0-4A9D-99A4-6F756B65018B}" type="datetimeFigureOut">
+            <a:fld id="{82863D6F-CADA-4CBB-9BC8-C824FEFDF3AA}" type="datetime1">
               <a:rPr lang="en-US" smtClean="0"/>
               <a:t>1/11/2021</a:t>
             </a:fld>
@@ -3263,7 +3641,7 @@
           <a:bodyPr/>
           <a:lstStyle/>
           <a:p>
-            <a:fld id="{7B272C57-2FA0-4A9D-99A4-6F756B65018B}" type="datetimeFigureOut">
+            <a:fld id="{37F291A6-8F2B-4188-87A0-8AB8D22BFD0F}" type="datetime1">
               <a:rPr lang="en-US" smtClean="0"/>
               <a:t>1/11/2021</a:t>
             </a:fld>
@@ -3637,7 +4015,7 @@
           <a:bodyPr/>
           <a:lstStyle/>
           <a:p>
-            <a:fld id="{7B272C57-2FA0-4A9D-99A4-6F756B65018B}" type="datetimeFigureOut">
+            <a:fld id="{2BD83222-261B-441B-9B30-86BFAF809E5B}" type="datetime1">
               <a:rPr lang="en-US" smtClean="0"/>
               <a:t>1/11/2021</a:t>
             </a:fld>
@@ -4393,7 +4771,7 @@
           <a:bodyPr/>
           <a:lstStyle/>
           <a:p>
-            <a:fld id="{7B272C57-2FA0-4A9D-99A4-6F756B65018B}" type="datetimeFigureOut">
+            <a:fld id="{5D777F57-8D2D-42BA-B55A-90D445C5E320}" type="datetime1">
               <a:rPr lang="en-US" smtClean="0"/>
               <a:t>1/11/2021</a:t>
             </a:fld>
@@ -4640,7 +5018,7 @@
             </a:lvl1pPr>
           </a:lstStyle>
           <a:p>
-            <a:fld id="{7B272C57-2FA0-4A9D-99A4-6F756B65018B}" type="datetimeFigureOut">
+            <a:fld id="{A6955ACC-A649-4413-919F-39E0D17FFCDE}" type="datetime1">
               <a:rPr lang="en-US" smtClean="0"/>
               <a:t>1/11/2021</a:t>
             </a:fld>
@@ -4792,6 +5170,7 @@
     <p:sldLayoutId id="2147483658" r:id="rId14"/>
     <p:sldLayoutId id="2147483659" r:id="rId15"/>
   </p:sldLayoutIdLst>
+  <p:hf hdr="0" dt="0"/>
   <p:txStyles>
     <p:titleStyle>
       <a:lvl1pPr algn="l" defTabSz="914400" rtl="0" eaLnBrk="1" latinLnBrk="0" hangingPunct="1">
@@ -4821,7 +5200,7 @@
           <a:spcPts val="1000"/>
         </a:spcBef>
         <a:buClr>
-          <a:schemeClr val="accent1"/>
+          <a:srgbClr val="0070C0"/>
         </a:buClr>
         <a:buSzPct val="110000"/>
         <a:buFont typeface="Wingdings" panose="05000000000000000000" pitchFamily="2" charset="2"/>
@@ -4843,7 +5222,7 @@
           <a:spcPts val="500"/>
         </a:spcBef>
         <a:buClr>
-          <a:schemeClr val="accent1"/>
+          <a:srgbClr val="0070C0"/>
         </a:buClr>
         <a:buSzPct val="110000"/>
         <a:buFont typeface="Wingdings" panose="05000000000000000000" pitchFamily="2" charset="2"/>
@@ -4865,7 +5244,7 @@
           <a:spcPts val="500"/>
         </a:spcBef>
         <a:buClr>
-          <a:schemeClr val="accent1"/>
+          <a:srgbClr val="0070C0"/>
         </a:buClr>
         <a:buSzPct val="110000"/>
         <a:buFont typeface="Wingdings" panose="05000000000000000000" pitchFamily="2" charset="2"/>
@@ -4887,7 +5266,7 @@
           <a:spcPts val="500"/>
         </a:spcBef>
         <a:buClr>
-          <a:schemeClr val="accent1"/>
+          <a:srgbClr val="0070C0"/>
         </a:buClr>
         <a:buSzPct val="110000"/>
         <a:buFont typeface="Wingdings" panose="05000000000000000000" pitchFamily="2" charset="2"/>
@@ -4909,7 +5288,7 @@
           <a:spcPts val="500"/>
         </a:spcBef>
         <a:buClr>
-          <a:schemeClr val="accent1"/>
+          <a:srgbClr val="0070C0"/>
         </a:buClr>
         <a:buSzPct val="110000"/>
         <a:buFont typeface="Wingdings" panose="05000000000000000000" pitchFamily="2" charset="2"/>
@@ -5388,4 +5767,299 @@
     </a:ext>
   </a:extLst>
 </a:theme>
+</file>
+
+<file path=ppt/theme/theme2.xml><?xml version="1.0" encoding="utf-8"?>
+<a:theme xmlns:a="http://schemas.openxmlformats.org/drawingml/2006/main" name="Office Theme">
+  <a:themeElements>
+    <a:clrScheme name="Office">
+      <a:dk1>
+        <a:sysClr val="windowText" lastClr="000000"/>
+      </a:dk1>
+      <a:lt1>
+        <a:sysClr val="window" lastClr="FFFFFF"/>
+      </a:lt1>
+      <a:dk2>
+        <a:srgbClr val="44546A"/>
+      </a:dk2>
+      <a:lt2>
+        <a:srgbClr val="E7E6E6"/>
+      </a:lt2>
+      <a:accent1>
+        <a:srgbClr val="4472C4"/>
+      </a:accent1>
+      <a:accent2>
+        <a:srgbClr val="ED7D31"/>
+      </a:accent2>
+      <a:accent3>
+        <a:srgbClr val="A5A5A5"/>
+      </a:accent3>
+      <a:accent4>
+        <a:srgbClr val="FFC000"/>
+      </a:accent4>
+      <a:accent5>
+        <a:srgbClr val="5B9BD5"/>
+      </a:accent5>
+      <a:accent6>
+        <a:srgbClr val="70AD47"/>
+      </a:accent6>
+      <a:hlink>
+        <a:srgbClr val="0563C1"/>
+      </a:hlink>
+      <a:folHlink>
+        <a:srgbClr val="954F72"/>
+      </a:folHlink>
+    </a:clrScheme>
+    <a:fontScheme name="Office">
+      <a:majorFont>
+        <a:latin typeface="Calibri Light" panose="020F0302020204030204"/>
+        <a:ea typeface=""/>
+        <a:cs typeface=""/>
+        <a:font script="Jpan" typeface="游ゴシック Light"/>
+        <a:font script="Hang" typeface="맑은 고딕"/>
+        <a:font script="Hans" typeface="等线 Light"/>
+        <a:font script="Hant" typeface="新細明體"/>
+        <a:font script="Arab" typeface="Times New Roman"/>
+        <a:font script="Hebr" typeface="Times New Roman"/>
+        <a:font script="Thai" typeface="Angsana New"/>
+        <a:font script="Ethi" typeface="Nyala"/>
+        <a:font script="Beng" typeface="Vrinda"/>
+        <a:font script="Gujr" typeface="Shruti"/>
+        <a:font script="Khmr" typeface="MoolBoran"/>
+        <a:font script="Knda" typeface="Tunga"/>
+        <a:font script="Guru" typeface="Raavi"/>
+        <a:font script="Cans" typeface="Euphemia"/>
+        <a:font script="Cher" typeface="Plantagenet Cherokee"/>
+        <a:font script="Yiii" typeface="Microsoft Yi Baiti"/>
+        <a:font script="Tibt" typeface="Microsoft Himalaya"/>
+        <a:font script="Thaa" typeface="MV Boli"/>
+        <a:font script="Deva" typeface="Mangal"/>
+        <a:font script="Telu" typeface="Gautami"/>
+        <a:font script="Taml" typeface="Latha"/>
+        <a:font script="Syrc" typeface="Estrangelo Edessa"/>
+        <a:font script="Orya" typeface="Kalinga"/>
+        <a:font script="Mlym" typeface="Kartika"/>
+        <a:font script="Laoo" typeface="DokChampa"/>
+        <a:font script="Sinh" typeface="Iskoola Pota"/>
+        <a:font script="Mong" typeface="Mongolian Baiti"/>
+        <a:font script="Viet" typeface="Times New Roman"/>
+        <a:font script="Uigh" typeface="Microsoft Uighur"/>
+        <a:font script="Geor" typeface="Sylfaen"/>
+        <a:font script="Armn" typeface="Arial"/>
+        <a:font script="Bugi" typeface="Leelawadee UI"/>
+        <a:font script="Bopo" typeface="Microsoft JhengHei"/>
+        <a:font script="Java" typeface="Javanese Text"/>
+        <a:font script="Lisu" typeface="Segoe UI"/>
+        <a:font script="Mymr" typeface="Myanmar Text"/>
+        <a:font script="Nkoo" typeface="Ebrima"/>
+        <a:font script="Olck" typeface="Nirmala UI"/>
+        <a:font script="Osma" typeface="Ebrima"/>
+        <a:font script="Phag" typeface="Phagspa"/>
+        <a:font script="Syrn" typeface="Estrangelo Edessa"/>
+        <a:font script="Syrj" typeface="Estrangelo Edessa"/>
+        <a:font script="Syre" typeface="Estrangelo Edessa"/>
+        <a:font script="Sora" typeface="Nirmala UI"/>
+        <a:font script="Tale" typeface="Microsoft Tai Le"/>
+        <a:font script="Talu" typeface="Microsoft New Tai Lue"/>
+        <a:font script="Tfng" typeface="Ebrima"/>
+      </a:majorFont>
+      <a:minorFont>
+        <a:latin typeface="Calibri" panose="020F0502020204030204"/>
+        <a:ea typeface=""/>
+        <a:cs typeface=""/>
+        <a:font script="Jpan" typeface="游ゴシック"/>
+        <a:font script="Hang" typeface="맑은 고딕"/>
+        <a:font script="Hans" typeface="等线"/>
+        <a:font script="Hant" typeface="新細明體"/>
+        <a:font script="Arab" typeface="Arial"/>
+        <a:font script="Hebr" typeface="Arial"/>
+        <a:font script="Thai" typeface="Cordia New"/>
+        <a:font script="Ethi" typeface="Nyala"/>
+        <a:font script="Beng" typeface="Vrinda"/>
+        <a:font script="Gujr" typeface="Shruti"/>
+        <a:font script="Khmr" typeface="DaunPenh"/>
+        <a:font script="Knda" typeface="Tunga"/>
+        <a:font script="Guru" typeface="Raavi"/>
+        <a:font script="Cans" typeface="Euphemia"/>
+        <a:font script="Cher" typeface="Plantagenet Cherokee"/>
+        <a:font script="Yiii" typeface="Microsoft Yi Baiti"/>
+        <a:font script="Tibt" typeface="Microsoft Himalaya"/>
+        <a:font script="Thaa" typeface="MV Boli"/>
+        <a:font script="Deva" typeface="Mangal"/>
+        <a:font script="Telu" typeface="Gautami"/>
+        <a:font script="Taml" typeface="Latha"/>
+        <a:font script="Syrc" typeface="Estrangelo Edessa"/>
+        <a:font script="Orya" typeface="Kalinga"/>
+        <a:font script="Mlym" typeface="Kartika"/>
+        <a:font script="Laoo" typeface="DokChampa"/>
+        <a:font script="Sinh" typeface="Iskoola Pota"/>
+        <a:font script="Mong" typeface="Mongolian Baiti"/>
+        <a:font script="Viet" typeface="Arial"/>
+        <a:font script="Uigh" typeface="Microsoft Uighur"/>
+        <a:font script="Geor" typeface="Sylfaen"/>
+        <a:font script="Armn" typeface="Arial"/>
+        <a:font script="Bugi" typeface="Leelawadee UI"/>
+        <a:font script="Bopo" typeface="Microsoft JhengHei"/>
+        <a:font script="Java" typeface="Javanese Text"/>
+        <a:font script="Lisu" typeface="Segoe UI"/>
+        <a:font script="Mymr" typeface="Myanmar Text"/>
+        <a:font script="Nkoo" typeface="Ebrima"/>
+        <a:font script="Olck" typeface="Nirmala UI"/>
+        <a:font script="Osma" typeface="Ebrima"/>
+        <a:font script="Phag" typeface="Phagspa"/>
+        <a:font script="Syrn" typeface="Estrangelo Edessa"/>
+        <a:font script="Syrj" typeface="Estrangelo Edessa"/>
+        <a:font script="Syre" typeface="Estrangelo Edessa"/>
+        <a:font script="Sora" typeface="Nirmala UI"/>
+        <a:font script="Tale" typeface="Microsoft Tai Le"/>
+        <a:font script="Talu" typeface="Microsoft New Tai Lue"/>
+        <a:font script="Tfng" typeface="Ebrima"/>
+      </a:minorFont>
+    </a:fontScheme>
+    <a:fmtScheme name="Office">
+      <a:fillStyleLst>
+        <a:solidFill>
+          <a:schemeClr val="phClr"/>
+        </a:solidFill>
+        <a:gradFill rotWithShape="1">
+          <a:gsLst>
+            <a:gs pos="0">
+              <a:schemeClr val="phClr">
+                <a:lumMod val="110000"/>
+                <a:satMod val="105000"/>
+                <a:tint val="67000"/>
+              </a:schemeClr>
+            </a:gs>
+            <a:gs pos="50000">
+              <a:schemeClr val="phClr">
+                <a:lumMod val="105000"/>
+                <a:satMod val="103000"/>
+                <a:tint val="73000"/>
+              </a:schemeClr>
+            </a:gs>
+            <a:gs pos="100000">
+              <a:schemeClr val="phClr">
+                <a:lumMod val="105000"/>
+                <a:satMod val="109000"/>
+                <a:tint val="81000"/>
+              </a:schemeClr>
+            </a:gs>
+          </a:gsLst>
+          <a:lin ang="5400000" scaled="0"/>
+        </a:gradFill>
+        <a:gradFill rotWithShape="1">
+          <a:gsLst>
+            <a:gs pos="0">
+              <a:schemeClr val="phClr">
+                <a:satMod val="103000"/>
+                <a:lumMod val="102000"/>
+                <a:tint val="94000"/>
+              </a:schemeClr>
+            </a:gs>
+            <a:gs pos="50000">
+              <a:schemeClr val="phClr">
+                <a:satMod val="110000"/>
+                <a:lumMod val="100000"/>
+                <a:shade val="100000"/>
+              </a:schemeClr>
+            </a:gs>
+            <a:gs pos="100000">
+              <a:schemeClr val="phClr">
+                <a:lumMod val="99000"/>
+                <a:satMod val="120000"/>
+                <a:shade val="78000"/>
+              </a:schemeClr>
+            </a:gs>
+          </a:gsLst>
+          <a:lin ang="5400000" scaled="0"/>
+        </a:gradFill>
+      </a:fillStyleLst>
+      <a:lnStyleLst>
+        <a:ln w="6350" cap="flat" cmpd="sng" algn="ctr">
+          <a:solidFill>
+            <a:schemeClr val="phClr"/>
+          </a:solidFill>
+          <a:prstDash val="solid"/>
+          <a:miter lim="800000"/>
+        </a:ln>
+        <a:ln w="12700" cap="flat" cmpd="sng" algn="ctr">
+          <a:solidFill>
+            <a:schemeClr val="phClr"/>
+          </a:solidFill>
+          <a:prstDash val="solid"/>
+          <a:miter lim="800000"/>
+        </a:ln>
+        <a:ln w="19050" cap="flat" cmpd="sng" algn="ctr">
+          <a:solidFill>
+            <a:schemeClr val="phClr"/>
+          </a:solidFill>
+          <a:prstDash val="solid"/>
+          <a:miter lim="800000"/>
+        </a:ln>
+      </a:lnStyleLst>
+      <a:effectStyleLst>
+        <a:effectStyle>
+          <a:effectLst/>
+        </a:effectStyle>
+        <a:effectStyle>
+          <a:effectLst/>
+        </a:effectStyle>
+        <a:effectStyle>
+          <a:effectLst>
+            <a:outerShdw blurRad="57150" dist="19050" dir="5400000" algn="ctr" rotWithShape="0">
+              <a:srgbClr val="000000">
+                <a:alpha val="63000"/>
+              </a:srgbClr>
+            </a:outerShdw>
+          </a:effectLst>
+        </a:effectStyle>
+      </a:effectStyleLst>
+      <a:bgFillStyleLst>
+        <a:solidFill>
+          <a:schemeClr val="phClr"/>
+        </a:solidFill>
+        <a:solidFill>
+          <a:schemeClr val="phClr">
+            <a:tint val="95000"/>
+            <a:satMod val="170000"/>
+          </a:schemeClr>
+        </a:solidFill>
+        <a:gradFill rotWithShape="1">
+          <a:gsLst>
+            <a:gs pos="0">
+              <a:schemeClr val="phClr">
+                <a:tint val="93000"/>
+                <a:satMod val="150000"/>
+                <a:shade val="98000"/>
+                <a:lumMod val="102000"/>
+              </a:schemeClr>
+            </a:gs>
+            <a:gs pos="50000">
+              <a:schemeClr val="phClr">
+                <a:tint val="98000"/>
+                <a:satMod val="130000"/>
+                <a:shade val="90000"/>
+                <a:lumMod val="103000"/>
+              </a:schemeClr>
+            </a:gs>
+            <a:gs pos="100000">
+              <a:schemeClr val="phClr">
+                <a:shade val="63000"/>
+                <a:satMod val="120000"/>
+              </a:schemeClr>
+            </a:gs>
+          </a:gsLst>
+          <a:lin ang="5400000" scaled="0"/>
+        </a:gradFill>
+      </a:bgFillStyleLst>
+    </a:fmtScheme>
+  </a:themeElements>
+  <a:objectDefaults/>
+  <a:extraClrSchemeLst/>
+  <a:extLst>
+    <a:ext uri="{05A4C25C-085E-4340-85A3-A5531E510DB2}">
+      <thm15:themeFamily xmlns:thm15="http://schemas.microsoft.com/office/thememl/2012/main" name="Office Theme" id="{62F939B6-93AF-4DB8-9C6B-D6C7DFDC589F}" vid="{4A3C46E8-61CC-4603-A589-7422A47A8E4A}"/>
+    </a:ext>
+  </a:extLst>
+</a:theme>
 </file>
</xml_diff>

<commit_message>
New layout Two Content Right Bigger
</commit_message>
<xml_diff>
--- a/inst/templates/TemplateIQ_169.pptx
+++ b/inst/templates/TemplateIQ_169.pptx
@@ -33,6 +33,7 @@
       <p:font typeface="Open Sans" panose="020B0606030504020204" pitchFamily="34" charset="0"/>
       <p:regular r:id="rId9"/>
       <p:bold r:id="rId10"/>
+      <p:italic r:id="rId11"/>
     </p:embeddedFont>
   </p:embeddedFontLst>
   <p:defaultTextStyle>
@@ -220,7 +221,7 @@
           <a:p>
             <a:fld id="{A5878FE3-DB01-4D8B-94BE-F31B6ED9B2F4}" type="datetimeFigureOut">
               <a:rPr lang="en-CH" smtClean="0"/>
-              <a:t>7 Jan 2022</a:t>
+              <a:t>05/16/2022</a:t>
             </a:fld>
             <a:endParaRPr lang="en-CH"/>
           </a:p>
@@ -682,7 +683,7 @@
           <a:p>
             <a:fld id="{A94D35BA-A7CE-4DE4-BA4E-04DE13CAAB29}" type="datetime1">
               <a:rPr lang="en-US" smtClean="0"/>
-              <a:t>1/7/2022</a:t>
+              <a:t>5/16/2022</a:t>
             </a:fld>
             <a:endParaRPr lang="en-US"/>
           </a:p>
@@ -891,6 +892,380 @@
 </file>
 
 <file path=ppt/slideLayouts/slideLayout10.xml><?xml version="1.0" encoding="utf-8"?>
+<p:sldLayout xmlns:a="http://schemas.openxmlformats.org/drawingml/2006/main" xmlns:r="http://schemas.openxmlformats.org/officeDocument/2006/relationships" xmlns:p="http://schemas.openxmlformats.org/presentationml/2006/main" preserve="1" userDrawn="1">
+  <p:cSld name="Two Content and Caption Left">
+    <p:bg>
+      <p:bgPr>
+        <a:solidFill>
+          <a:schemeClr val="bg1"/>
+        </a:solidFill>
+        <a:effectLst/>
+      </p:bgPr>
+    </p:bg>
+    <p:spTree>
+      <p:nvGrpSpPr>
+        <p:cNvPr id="1" name=""/>
+        <p:cNvGrpSpPr/>
+        <p:nvPr/>
+      </p:nvGrpSpPr>
+      <p:grpSpPr>
+        <a:xfrm>
+          <a:off x="0" y="0"/>
+          <a:ext cx="0" cy="0"/>
+          <a:chOff x="0" y="0"/>
+          <a:chExt cx="0" cy="0"/>
+        </a:xfrm>
+      </p:grpSpPr>
+      <p:sp>
+        <p:nvSpPr>
+          <p:cNvPr id="5" name="Date Placeholder 4">
+            <a:extLst>
+              <a:ext uri="{FF2B5EF4-FFF2-40B4-BE49-F238E27FC236}">
+                <a16:creationId xmlns:a16="http://schemas.microsoft.com/office/drawing/2014/main" id="{985F3433-3055-4279-A232-CDB35C481677}"/>
+              </a:ext>
+            </a:extLst>
+          </p:cNvPr>
+          <p:cNvSpPr>
+            <a:spLocks noGrp="1"/>
+          </p:cNvSpPr>
+          <p:nvPr>
+            <p:ph type="dt" sz="half" idx="10"/>
+          </p:nvPr>
+        </p:nvSpPr>
+        <p:spPr/>
+        <p:txBody>
+          <a:bodyPr/>
+          <a:lstStyle/>
+          <a:p>
+            <a:fld id="{37F291A6-8F2B-4188-87A0-8AB8D22BFD0F}" type="datetime1">
+              <a:rPr lang="en-US" smtClean="0"/>
+              <a:t>5/16/2022</a:t>
+            </a:fld>
+            <a:endParaRPr lang="en-US"/>
+          </a:p>
+        </p:txBody>
+      </p:sp>
+      <p:sp>
+        <p:nvSpPr>
+          <p:cNvPr id="6" name="Footer Placeholder 5">
+            <a:extLst>
+              <a:ext uri="{FF2B5EF4-FFF2-40B4-BE49-F238E27FC236}">
+                <a16:creationId xmlns:a16="http://schemas.microsoft.com/office/drawing/2014/main" id="{C4190A63-5D67-4FD5-97FD-79F7445B6A2E}"/>
+              </a:ext>
+            </a:extLst>
+          </p:cNvPr>
+          <p:cNvSpPr>
+            <a:spLocks noGrp="1"/>
+          </p:cNvSpPr>
+          <p:nvPr>
+            <p:ph type="ftr" sz="quarter" idx="11"/>
+          </p:nvPr>
+        </p:nvSpPr>
+        <p:spPr/>
+        <p:txBody>
+          <a:bodyPr/>
+          <a:lstStyle/>
+          <a:p>
+            <a:endParaRPr lang="en-US"/>
+          </a:p>
+        </p:txBody>
+      </p:sp>
+      <p:sp>
+        <p:nvSpPr>
+          <p:cNvPr id="7" name="Slide Number Placeholder 6">
+            <a:extLst>
+              <a:ext uri="{FF2B5EF4-FFF2-40B4-BE49-F238E27FC236}">
+                <a16:creationId xmlns:a16="http://schemas.microsoft.com/office/drawing/2014/main" id="{D2687DAE-A442-4DC3-8550-20F58B781EC7}"/>
+              </a:ext>
+            </a:extLst>
+          </p:cNvPr>
+          <p:cNvSpPr>
+            <a:spLocks noGrp="1"/>
+          </p:cNvSpPr>
+          <p:nvPr>
+            <p:ph type="sldNum" sz="quarter" idx="12"/>
+          </p:nvPr>
+        </p:nvSpPr>
+        <p:spPr/>
+        <p:txBody>
+          <a:bodyPr/>
+          <a:lstStyle/>
+          <a:p>
+            <a:fld id="{C064A79B-B315-413E-88BB-EFE0B5D603D0}" type="slidenum">
+              <a:rPr lang="en-US" smtClean="0"/>
+              <a:t>‹#›</a:t>
+            </a:fld>
+            <a:endParaRPr lang="en-US"/>
+          </a:p>
+        </p:txBody>
+      </p:sp>
+      <p:sp>
+        <p:nvSpPr>
+          <p:cNvPr id="9" name="Title 1">
+            <a:extLst>
+              <a:ext uri="{FF2B5EF4-FFF2-40B4-BE49-F238E27FC236}">
+                <a16:creationId xmlns:a16="http://schemas.microsoft.com/office/drawing/2014/main" id="{177E17F1-D3B2-42A6-9982-8788655386CF}"/>
+              </a:ext>
+            </a:extLst>
+          </p:cNvPr>
+          <p:cNvSpPr>
+            <a:spLocks noGrp="1"/>
+          </p:cNvSpPr>
+          <p:nvPr>
+            <p:ph type="title"/>
+          </p:nvPr>
+        </p:nvSpPr>
+        <p:spPr>
+          <a:xfrm>
+            <a:off x="0" y="0"/>
+            <a:ext cx="12192000" cy="1013635"/>
+          </a:xfrm>
+          <a:solidFill>
+            <a:srgbClr val="0070C0"/>
+          </a:solidFill>
+        </p:spPr>
+        <p:txBody>
+          <a:bodyPr/>
+          <a:lstStyle>
+            <a:lvl1pPr>
+              <a:defRPr lang="en-US" dirty="0"/>
+            </a:lvl1pPr>
+          </a:lstStyle>
+          <a:p>
+            <a:r>
+              <a:rPr lang="en-US" dirty="0"/>
+              <a:t>Click to edit Master title style</a:t>
+            </a:r>
+          </a:p>
+        </p:txBody>
+      </p:sp>
+      <p:sp>
+        <p:nvSpPr>
+          <p:cNvPr id="10" name="Content Placeholder 2">
+            <a:extLst>
+              <a:ext uri="{FF2B5EF4-FFF2-40B4-BE49-F238E27FC236}">
+                <a16:creationId xmlns:a16="http://schemas.microsoft.com/office/drawing/2014/main" id="{F1A58CC4-526C-4991-898F-C0879D5343E8}"/>
+              </a:ext>
+            </a:extLst>
+          </p:cNvPr>
+          <p:cNvSpPr>
+            <a:spLocks noGrp="1"/>
+          </p:cNvSpPr>
+          <p:nvPr>
+            <p:ph sz="half" idx="1"/>
+          </p:nvPr>
+        </p:nvSpPr>
+        <p:spPr>
+          <a:xfrm>
+            <a:off x="250521" y="1205547"/>
+            <a:ext cx="5769279" cy="4446906"/>
+          </a:xfrm>
+        </p:spPr>
+        <p:txBody>
+          <a:bodyPr/>
+          <a:lstStyle/>
+          <a:p>
+            <a:pPr lvl="0"/>
+            <a:r>
+              <a:rPr lang="en-US"/>
+              <a:t>Click to edit Master text styles</a:t>
+            </a:r>
+          </a:p>
+          <a:p>
+            <a:pPr lvl="1"/>
+            <a:r>
+              <a:rPr lang="en-US"/>
+              <a:t>Second level</a:t>
+            </a:r>
+          </a:p>
+          <a:p>
+            <a:pPr lvl="2"/>
+            <a:r>
+              <a:rPr lang="en-US"/>
+              <a:t>Third level</a:t>
+            </a:r>
+          </a:p>
+          <a:p>
+            <a:pPr lvl="3"/>
+            <a:r>
+              <a:rPr lang="en-US"/>
+              <a:t>Fourth level</a:t>
+            </a:r>
+          </a:p>
+          <a:p>
+            <a:pPr lvl="4"/>
+            <a:r>
+              <a:rPr lang="en-US"/>
+              <a:t>Fifth level</a:t>
+            </a:r>
+          </a:p>
+        </p:txBody>
+      </p:sp>
+      <p:sp>
+        <p:nvSpPr>
+          <p:cNvPr id="11" name="Content Placeholder 3">
+            <a:extLst>
+              <a:ext uri="{FF2B5EF4-FFF2-40B4-BE49-F238E27FC236}">
+                <a16:creationId xmlns:a16="http://schemas.microsoft.com/office/drawing/2014/main" id="{CB008E43-F727-4C47-9855-9440A412ACCB}"/>
+              </a:ext>
+            </a:extLst>
+          </p:cNvPr>
+          <p:cNvSpPr>
+            <a:spLocks noGrp="1"/>
+          </p:cNvSpPr>
+          <p:nvPr>
+            <p:ph sz="half" idx="2"/>
+          </p:nvPr>
+        </p:nvSpPr>
+        <p:spPr>
+          <a:xfrm>
+            <a:off x="6172199" y="1205548"/>
+            <a:ext cx="5727527" cy="5021670"/>
+          </a:xfrm>
+        </p:spPr>
+        <p:txBody>
+          <a:bodyPr/>
+          <a:lstStyle/>
+          <a:p>
+            <a:pPr lvl="0"/>
+            <a:r>
+              <a:rPr lang="en-US"/>
+              <a:t>Click to edit Master text styles</a:t>
+            </a:r>
+          </a:p>
+          <a:p>
+            <a:pPr lvl="1"/>
+            <a:r>
+              <a:rPr lang="en-US"/>
+              <a:t>Second level</a:t>
+            </a:r>
+          </a:p>
+          <a:p>
+            <a:pPr lvl="2"/>
+            <a:r>
+              <a:rPr lang="en-US"/>
+              <a:t>Third level</a:t>
+            </a:r>
+          </a:p>
+          <a:p>
+            <a:pPr lvl="3"/>
+            <a:r>
+              <a:rPr lang="en-US"/>
+              <a:t>Fourth level</a:t>
+            </a:r>
+          </a:p>
+          <a:p>
+            <a:pPr lvl="4"/>
+            <a:r>
+              <a:rPr lang="en-US"/>
+              <a:t>Fifth level</a:t>
+            </a:r>
+          </a:p>
+        </p:txBody>
+      </p:sp>
+      <p:sp>
+        <p:nvSpPr>
+          <p:cNvPr id="3" name="Text Placeholder 2">
+            <a:extLst>
+              <a:ext uri="{FF2B5EF4-FFF2-40B4-BE49-F238E27FC236}">
+                <a16:creationId xmlns:a16="http://schemas.microsoft.com/office/drawing/2014/main" id="{B6810FF5-0B9C-4441-B73D-B10146FB8996}"/>
+              </a:ext>
+            </a:extLst>
+          </p:cNvPr>
+          <p:cNvSpPr>
+            <a:spLocks noGrp="1"/>
+          </p:cNvSpPr>
+          <p:nvPr>
+            <p:ph type="body" sz="quarter" idx="13"/>
+          </p:nvPr>
+        </p:nvSpPr>
+        <p:spPr>
+          <a:xfrm>
+            <a:off x="250521" y="5781584"/>
+            <a:ext cx="5769279" cy="445634"/>
+          </a:xfrm>
+        </p:spPr>
+        <p:txBody>
+          <a:bodyPr/>
+          <a:lstStyle>
+            <a:lvl1pPr marL="0" indent="0">
+              <a:buFont typeface="Arial" panose="020B0604020202020204" pitchFamily="34" charset="0"/>
+              <a:buNone/>
+              <a:defRPr sz="1200"/>
+            </a:lvl1pPr>
+            <a:lvl2pPr marL="457200" indent="0">
+              <a:buFont typeface="Arial" panose="020B0604020202020204" pitchFamily="34" charset="0"/>
+              <a:buNone/>
+              <a:defRPr sz="1100"/>
+            </a:lvl2pPr>
+            <a:lvl3pPr marL="914400" indent="0">
+              <a:buFont typeface="Arial" panose="020B0604020202020204" pitchFamily="34" charset="0"/>
+              <a:buNone/>
+              <a:defRPr sz="1050"/>
+            </a:lvl3pPr>
+            <a:lvl4pPr marL="1371600" indent="0">
+              <a:buFont typeface="Arial" panose="020B0604020202020204" pitchFamily="34" charset="0"/>
+              <a:buNone/>
+              <a:defRPr sz="1000"/>
+            </a:lvl4pPr>
+            <a:lvl5pPr marL="1828800" indent="0">
+              <a:buFont typeface="Arial" panose="020B0604020202020204" pitchFamily="34" charset="0"/>
+              <a:buNone/>
+              <a:defRPr sz="1000"/>
+            </a:lvl5pPr>
+          </a:lstStyle>
+          <a:p>
+            <a:pPr lvl="0"/>
+            <a:r>
+              <a:rPr lang="en-US" dirty="0"/>
+              <a:t>Click to edit Master text styles</a:t>
+            </a:r>
+          </a:p>
+          <a:p>
+            <a:pPr lvl="1"/>
+            <a:r>
+              <a:rPr lang="en-US" dirty="0"/>
+              <a:t>Second level</a:t>
+            </a:r>
+          </a:p>
+          <a:p>
+            <a:pPr lvl="2"/>
+            <a:r>
+              <a:rPr lang="en-US" dirty="0"/>
+              <a:t>Third level</a:t>
+            </a:r>
+          </a:p>
+          <a:p>
+            <a:pPr lvl="3"/>
+            <a:r>
+              <a:rPr lang="en-US" dirty="0"/>
+              <a:t>Fourth level</a:t>
+            </a:r>
+          </a:p>
+          <a:p>
+            <a:pPr lvl="4"/>
+            <a:r>
+              <a:rPr lang="en-US" dirty="0"/>
+              <a:t>Fifth level</a:t>
+            </a:r>
+            <a:endParaRPr lang="en-CH" dirty="0"/>
+          </a:p>
+        </p:txBody>
+      </p:sp>
+    </p:spTree>
+    <p:extLst>
+      <p:ext uri="{BB962C8B-B14F-4D97-AF65-F5344CB8AC3E}">
+        <p14:creationId xmlns:p14="http://schemas.microsoft.com/office/powerpoint/2010/main" val="3059227006"/>
+      </p:ext>
+    </p:extLst>
+  </p:cSld>
+  <p:clrMapOvr>
+    <a:masterClrMapping/>
+  </p:clrMapOvr>
+</p:sldLayout>
+</file>
+
+<file path=ppt/slideLayouts/slideLayout11.xml><?xml version="1.0" encoding="utf-8"?>
 <p:sldLayout xmlns:a="http://schemas.openxmlformats.org/drawingml/2006/main" xmlns:r="http://schemas.openxmlformats.org/officeDocument/2006/relationships" xmlns:p="http://schemas.openxmlformats.org/presentationml/2006/main" preserve="1" userDrawn="1">
   <p:cSld name="Two Content and Caption">
     <p:bg>
@@ -938,7 +1313,7 @@
           <a:p>
             <a:fld id="{2BD83222-261B-441B-9B30-86BFAF809E5B}" type="datetime1">
               <a:rPr lang="en-US" smtClean="0"/>
-              <a:t>1/7/2022</a:t>
+              <a:t>5/16/2022</a:t>
             </a:fld>
             <a:endParaRPr lang="en-US"/>
           </a:p>
@@ -1355,7 +1730,7 @@
 </p:sldLayout>
 </file>
 
-<file path=ppt/slideLayouts/slideLayout11.xml><?xml version="1.0" encoding="utf-8"?>
+<file path=ppt/slideLayouts/slideLayout12.xml><?xml version="1.0" encoding="utf-8"?>
 <p:sldLayout xmlns:a="http://schemas.openxmlformats.org/drawingml/2006/main" xmlns:r="http://schemas.openxmlformats.org/officeDocument/2006/relationships" xmlns:p="http://schemas.openxmlformats.org/presentationml/2006/main" type="twoTxTwoObj" preserve="1">
   <p:cSld name="Comparison">
     <p:spTree>
@@ -1694,7 +2069,7 @@
           <a:p>
             <a:fld id="{5D777F57-8D2D-42BA-B55A-90D445C5E320}" type="datetime1">
               <a:rPr lang="en-US" smtClean="0"/>
-              <a:t>1/7/2022</a:t>
+              <a:t>5/16/2022</a:t>
             </a:fld>
             <a:endParaRPr lang="en-US"/>
           </a:p>
@@ -1767,7 +2142,7 @@
 </p:sldLayout>
 </file>
 
-<file path=ppt/slideLayouts/slideLayout12.xml><?xml version="1.0" encoding="utf-8"?>
+<file path=ppt/slideLayouts/slideLayout13.xml><?xml version="1.0" encoding="utf-8"?>
 <p:sldLayout xmlns:a="http://schemas.openxmlformats.org/drawingml/2006/main" xmlns:r="http://schemas.openxmlformats.org/officeDocument/2006/relationships" xmlns:p="http://schemas.openxmlformats.org/presentationml/2006/main" type="titleOnly" preserve="1">
   <p:cSld name="Title Only">
     <p:spTree>
@@ -1851,7 +2226,7 @@
           <a:p>
             <a:fld id="{4FFDB71B-036A-4BEC-86F0-EDFEFDE2EF08}" type="datetime1">
               <a:rPr lang="en-US" smtClean="0"/>
-              <a:t>1/7/2022</a:t>
+              <a:t>5/16/2022</a:t>
             </a:fld>
             <a:endParaRPr lang="en-US"/>
           </a:p>
@@ -1924,7 +2299,7 @@
 </p:sldLayout>
 </file>
 
-<file path=ppt/slideLayouts/slideLayout13.xml><?xml version="1.0" encoding="utf-8"?>
+<file path=ppt/slideLayouts/slideLayout14.xml><?xml version="1.0" encoding="utf-8"?>
 <p:sldLayout xmlns:a="http://schemas.openxmlformats.org/drawingml/2006/main" xmlns:r="http://schemas.openxmlformats.org/officeDocument/2006/relationships" xmlns:p="http://schemas.openxmlformats.org/presentationml/2006/main" type="blank" preserve="1">
   <p:cSld name="Blank">
     <p:spTree>
@@ -1964,7 +2339,7 @@
           <a:p>
             <a:fld id="{1F05B7B7-0FF3-4A2C-AC43-F7175C6B92C9}" type="datetime1">
               <a:rPr lang="en-US" smtClean="0"/>
-              <a:t>1/7/2022</a:t>
+              <a:t>5/16/2022</a:t>
             </a:fld>
             <a:endParaRPr lang="en-US"/>
           </a:p>
@@ -2037,7 +2412,7 @@
 </p:sldLayout>
 </file>
 
-<file path=ppt/slideLayouts/slideLayout14.xml><?xml version="1.0" encoding="utf-8"?>
+<file path=ppt/slideLayouts/slideLayout15.xml><?xml version="1.0" encoding="utf-8"?>
 <p:sldLayout xmlns:a="http://schemas.openxmlformats.org/drawingml/2006/main" xmlns:r="http://schemas.openxmlformats.org/officeDocument/2006/relationships" xmlns:p="http://schemas.openxmlformats.org/presentationml/2006/main" type="objTx" preserve="1">
   <p:cSld name="Content with Caption">
     <p:spTree>
@@ -2275,7 +2650,7 @@
           <a:p>
             <a:fld id="{A1B82BB3-4412-471D-9666-F484886DD79A}" type="datetime1">
               <a:rPr lang="en-US" smtClean="0"/>
-              <a:t>1/7/2022</a:t>
+              <a:t>5/16/2022</a:t>
             </a:fld>
             <a:endParaRPr lang="en-US"/>
           </a:p>
@@ -2348,7 +2723,7 @@
 </p:sldLayout>
 </file>
 
-<file path=ppt/slideLayouts/slideLayout15.xml><?xml version="1.0" encoding="utf-8"?>
+<file path=ppt/slideLayouts/slideLayout16.xml><?xml version="1.0" encoding="utf-8"?>
 <p:sldLayout xmlns:a="http://schemas.openxmlformats.org/drawingml/2006/main" xmlns:r="http://schemas.openxmlformats.org/officeDocument/2006/relationships" xmlns:p="http://schemas.openxmlformats.org/presentationml/2006/main" type="picTx" preserve="1">
   <p:cSld name="Picture with Caption">
     <p:spTree>
@@ -2563,7 +2938,7 @@
           <a:p>
             <a:fld id="{C7F460FB-AFF6-4091-BC6E-B2ACC5584478}" type="datetime1">
               <a:rPr lang="en-US" smtClean="0"/>
-              <a:t>1/7/2022</a:t>
+              <a:t>5/16/2022</a:t>
             </a:fld>
             <a:endParaRPr lang="en-US"/>
           </a:p>
@@ -2636,7 +3011,7 @@
 </p:sldLayout>
 </file>
 
-<file path=ppt/slideLayouts/slideLayout16.xml><?xml version="1.0" encoding="utf-8"?>
+<file path=ppt/slideLayouts/slideLayout17.xml><?xml version="1.0" encoding="utf-8"?>
 <p:sldLayout xmlns:a="http://schemas.openxmlformats.org/drawingml/2006/main" xmlns:r="http://schemas.openxmlformats.org/officeDocument/2006/relationships" xmlns:p="http://schemas.openxmlformats.org/presentationml/2006/main" type="vertTx" preserve="1">
   <p:cSld name="Title and Vertical Text">
     <p:spTree>
@@ -2761,7 +3136,7 @@
           <a:p>
             <a:fld id="{9A020F0C-73CD-4F55-8075-41C6738BAAA7}" type="datetime1">
               <a:rPr lang="en-US" smtClean="0"/>
-              <a:t>1/7/2022</a:t>
+              <a:t>5/16/2022</a:t>
             </a:fld>
             <a:endParaRPr lang="en-US"/>
           </a:p>
@@ -2834,7 +3209,7 @@
 </p:sldLayout>
 </file>
 
-<file path=ppt/slideLayouts/slideLayout17.xml><?xml version="1.0" encoding="utf-8"?>
+<file path=ppt/slideLayouts/slideLayout18.xml><?xml version="1.0" encoding="utf-8"?>
 <p:sldLayout xmlns:a="http://schemas.openxmlformats.org/drawingml/2006/main" xmlns:r="http://schemas.openxmlformats.org/officeDocument/2006/relationships" xmlns:p="http://schemas.openxmlformats.org/presentationml/2006/main" type="vertTitleAndTx" preserve="1">
   <p:cSld name="Vertical Title and Text">
     <p:spTree>
@@ -2969,7 +3344,7 @@
           <a:p>
             <a:fld id="{B20BEDA7-737D-42F6-A80F-11BC05D68277}" type="datetime1">
               <a:rPr lang="en-US" smtClean="0"/>
-              <a:t>1/7/2022</a:t>
+              <a:t>5/16/2022</a:t>
             </a:fld>
             <a:endParaRPr lang="en-US"/>
           </a:p>
@@ -3172,7 +3547,7 @@
           <a:p>
             <a:fld id="{E2B48A43-9742-48CA-9491-6C2FDC78AC32}" type="datetime1">
               <a:rPr lang="en-US" smtClean="0"/>
-              <a:t>1/7/2022</a:t>
+              <a:t>5/16/2022</a:t>
             </a:fld>
             <a:endParaRPr lang="en-US"/>
           </a:p>
@@ -3639,7 +4014,7 @@
           <a:p>
             <a:fld id="{EBBF1247-5EB7-40A1-AFD7-5FD82AF1AAB3}" type="datetime1">
               <a:rPr lang="en-US" smtClean="0"/>
-              <a:t>1/7/2022</a:t>
+              <a:t>5/16/2022</a:t>
             </a:fld>
             <a:endParaRPr lang="en-US"/>
           </a:p>
@@ -4345,7 +4720,7 @@
           <a:p>
             <a:fld id="{73181174-1282-44A5-AC8B-21F286D386F9}" type="datetime1">
               <a:rPr lang="en-US" smtClean="0"/>
-              <a:t>1/7/2022</a:t>
+              <a:t>5/16/2022</a:t>
             </a:fld>
             <a:endParaRPr lang="en-US"/>
           </a:p>
@@ -4466,7 +4841,7 @@
           <a:p>
             <a:fld id="{037FCF08-CE9A-4644-A888-AE2F1DE5AE92}" type="datetime1">
               <a:rPr lang="en-US" smtClean="0"/>
-              <a:t>1/7/2022</a:t>
+              <a:t>5/16/2022</a:t>
             </a:fld>
             <a:endParaRPr lang="en-US"/>
           </a:p>
@@ -4704,6 +5079,309 @@
 </file>
 
 <file path=ppt/slideLayouts/slideLayout8.xml><?xml version="1.0" encoding="utf-8"?>
+<p:sldLayout xmlns:a="http://schemas.openxmlformats.org/drawingml/2006/main" xmlns:r="http://schemas.openxmlformats.org/officeDocument/2006/relationships" xmlns:p="http://schemas.openxmlformats.org/presentationml/2006/main" preserve="1" userDrawn="1">
+  <p:cSld name="Two Content Right Bigger">
+    <p:bg>
+      <p:bgPr>
+        <a:solidFill>
+          <a:schemeClr val="bg1"/>
+        </a:solidFill>
+        <a:effectLst/>
+      </p:bgPr>
+    </p:bg>
+    <p:spTree>
+      <p:nvGrpSpPr>
+        <p:cNvPr id="1" name=""/>
+        <p:cNvGrpSpPr/>
+        <p:nvPr/>
+      </p:nvGrpSpPr>
+      <p:grpSpPr>
+        <a:xfrm>
+          <a:off x="0" y="0"/>
+          <a:ext cx="0" cy="0"/>
+          <a:chOff x="0" y="0"/>
+          <a:chExt cx="0" cy="0"/>
+        </a:xfrm>
+      </p:grpSpPr>
+      <p:sp>
+        <p:nvSpPr>
+          <p:cNvPr id="5" name="Date Placeholder 4">
+            <a:extLst>
+              <a:ext uri="{FF2B5EF4-FFF2-40B4-BE49-F238E27FC236}">
+                <a16:creationId xmlns:a16="http://schemas.microsoft.com/office/drawing/2014/main" id="{985F3433-3055-4279-A232-CDB35C481677}"/>
+              </a:ext>
+            </a:extLst>
+          </p:cNvPr>
+          <p:cNvSpPr>
+            <a:spLocks noGrp="1"/>
+          </p:cNvSpPr>
+          <p:nvPr>
+            <p:ph type="dt" sz="half" idx="10"/>
+          </p:nvPr>
+        </p:nvSpPr>
+        <p:spPr/>
+        <p:txBody>
+          <a:bodyPr/>
+          <a:lstStyle/>
+          <a:p>
+            <a:fld id="{037FCF08-CE9A-4644-A888-AE2F1DE5AE92}" type="datetime1">
+              <a:rPr lang="en-US" smtClean="0"/>
+              <a:t>5/16/2022</a:t>
+            </a:fld>
+            <a:endParaRPr lang="en-US"/>
+          </a:p>
+        </p:txBody>
+      </p:sp>
+      <p:sp>
+        <p:nvSpPr>
+          <p:cNvPr id="6" name="Footer Placeholder 5">
+            <a:extLst>
+              <a:ext uri="{FF2B5EF4-FFF2-40B4-BE49-F238E27FC236}">
+                <a16:creationId xmlns:a16="http://schemas.microsoft.com/office/drawing/2014/main" id="{C4190A63-5D67-4FD5-97FD-79F7445B6A2E}"/>
+              </a:ext>
+            </a:extLst>
+          </p:cNvPr>
+          <p:cNvSpPr>
+            <a:spLocks noGrp="1"/>
+          </p:cNvSpPr>
+          <p:nvPr>
+            <p:ph type="ftr" sz="quarter" idx="11"/>
+          </p:nvPr>
+        </p:nvSpPr>
+        <p:spPr/>
+        <p:txBody>
+          <a:bodyPr/>
+          <a:lstStyle/>
+          <a:p>
+            <a:endParaRPr lang="en-US"/>
+          </a:p>
+        </p:txBody>
+      </p:sp>
+      <p:sp>
+        <p:nvSpPr>
+          <p:cNvPr id="7" name="Slide Number Placeholder 6">
+            <a:extLst>
+              <a:ext uri="{FF2B5EF4-FFF2-40B4-BE49-F238E27FC236}">
+                <a16:creationId xmlns:a16="http://schemas.microsoft.com/office/drawing/2014/main" id="{D2687DAE-A442-4DC3-8550-20F58B781EC7}"/>
+              </a:ext>
+            </a:extLst>
+          </p:cNvPr>
+          <p:cNvSpPr>
+            <a:spLocks noGrp="1"/>
+          </p:cNvSpPr>
+          <p:nvPr>
+            <p:ph type="sldNum" sz="quarter" idx="12"/>
+          </p:nvPr>
+        </p:nvSpPr>
+        <p:spPr/>
+        <p:txBody>
+          <a:bodyPr/>
+          <a:lstStyle/>
+          <a:p>
+            <a:fld id="{C064A79B-B315-413E-88BB-EFE0B5D603D0}" type="slidenum">
+              <a:rPr lang="en-US" smtClean="0"/>
+              <a:t>‹#›</a:t>
+            </a:fld>
+            <a:endParaRPr lang="en-US"/>
+          </a:p>
+        </p:txBody>
+      </p:sp>
+      <p:sp>
+        <p:nvSpPr>
+          <p:cNvPr id="9" name="Title 1">
+            <a:extLst>
+              <a:ext uri="{FF2B5EF4-FFF2-40B4-BE49-F238E27FC236}">
+                <a16:creationId xmlns:a16="http://schemas.microsoft.com/office/drawing/2014/main" id="{177E17F1-D3B2-42A6-9982-8788655386CF}"/>
+              </a:ext>
+            </a:extLst>
+          </p:cNvPr>
+          <p:cNvSpPr>
+            <a:spLocks noGrp="1"/>
+          </p:cNvSpPr>
+          <p:nvPr>
+            <p:ph type="title"/>
+          </p:nvPr>
+        </p:nvSpPr>
+        <p:spPr>
+          <a:xfrm>
+            <a:off x="0" y="0"/>
+            <a:ext cx="12192000" cy="1013635"/>
+          </a:xfrm>
+          <a:solidFill>
+            <a:srgbClr val="0070C0"/>
+          </a:solidFill>
+        </p:spPr>
+        <p:txBody>
+          <a:bodyPr/>
+          <a:lstStyle>
+            <a:lvl1pPr>
+              <a:defRPr lang="en-US" dirty="0"/>
+            </a:lvl1pPr>
+          </a:lstStyle>
+          <a:p>
+            <a:r>
+              <a:rPr lang="en-US" dirty="0"/>
+              <a:t>Click to edit Master title style</a:t>
+            </a:r>
+          </a:p>
+        </p:txBody>
+      </p:sp>
+      <p:sp>
+        <p:nvSpPr>
+          <p:cNvPr id="10" name="Content Placeholder 2">
+            <a:extLst>
+              <a:ext uri="{FF2B5EF4-FFF2-40B4-BE49-F238E27FC236}">
+                <a16:creationId xmlns:a16="http://schemas.microsoft.com/office/drawing/2014/main" id="{F1A58CC4-526C-4991-898F-C0879D5343E8}"/>
+              </a:ext>
+            </a:extLst>
+          </p:cNvPr>
+          <p:cNvSpPr>
+            <a:spLocks noGrp="1"/>
+          </p:cNvSpPr>
+          <p:nvPr>
+            <p:ph sz="half" idx="1"/>
+          </p:nvPr>
+        </p:nvSpPr>
+        <p:spPr>
+          <a:xfrm>
+            <a:off x="250521" y="1205547"/>
+            <a:ext cx="3390454" cy="4971416"/>
+          </a:xfrm>
+        </p:spPr>
+        <p:txBody>
+          <a:bodyPr>
+            <a:normAutofit/>
+          </a:bodyPr>
+          <a:lstStyle>
+            <a:lvl1pPr>
+              <a:defRPr sz="1400"/>
+            </a:lvl1pPr>
+            <a:lvl2pPr>
+              <a:defRPr sz="1200"/>
+            </a:lvl2pPr>
+            <a:lvl3pPr>
+              <a:defRPr sz="1100"/>
+            </a:lvl3pPr>
+            <a:lvl4pPr>
+              <a:defRPr sz="1050"/>
+            </a:lvl4pPr>
+            <a:lvl5pPr>
+              <a:defRPr sz="1050"/>
+            </a:lvl5pPr>
+          </a:lstStyle>
+          <a:p>
+            <a:pPr lvl="0"/>
+            <a:r>
+              <a:rPr lang="en-US" dirty="0"/>
+              <a:t>Click to edit Master text styles</a:t>
+            </a:r>
+          </a:p>
+          <a:p>
+            <a:pPr lvl="1"/>
+            <a:r>
+              <a:rPr lang="en-US" dirty="0"/>
+              <a:t>Second level</a:t>
+            </a:r>
+          </a:p>
+          <a:p>
+            <a:pPr lvl="2"/>
+            <a:r>
+              <a:rPr lang="en-US" dirty="0"/>
+              <a:t>Third level</a:t>
+            </a:r>
+          </a:p>
+          <a:p>
+            <a:pPr lvl="3"/>
+            <a:r>
+              <a:rPr lang="en-US" dirty="0"/>
+              <a:t>Fourth level</a:t>
+            </a:r>
+          </a:p>
+          <a:p>
+            <a:pPr lvl="4"/>
+            <a:r>
+              <a:rPr lang="en-US" dirty="0"/>
+              <a:t>Fifth level</a:t>
+            </a:r>
+          </a:p>
+        </p:txBody>
+      </p:sp>
+      <p:sp>
+        <p:nvSpPr>
+          <p:cNvPr id="11" name="Content Placeholder 3">
+            <a:extLst>
+              <a:ext uri="{FF2B5EF4-FFF2-40B4-BE49-F238E27FC236}">
+                <a16:creationId xmlns:a16="http://schemas.microsoft.com/office/drawing/2014/main" id="{CB008E43-F727-4C47-9855-9440A412ACCB}"/>
+              </a:ext>
+            </a:extLst>
+          </p:cNvPr>
+          <p:cNvSpPr>
+            <a:spLocks noGrp="1"/>
+          </p:cNvSpPr>
+          <p:nvPr>
+            <p:ph sz="half" idx="2"/>
+          </p:nvPr>
+        </p:nvSpPr>
+        <p:spPr>
+          <a:xfrm>
+            <a:off x="3707477" y="1205547"/>
+            <a:ext cx="8192250" cy="4971416"/>
+          </a:xfrm>
+        </p:spPr>
+        <p:txBody>
+          <a:bodyPr/>
+          <a:lstStyle/>
+          <a:p>
+            <a:pPr lvl="0"/>
+            <a:r>
+              <a:rPr lang="en-US"/>
+              <a:t>Click to edit Master text styles</a:t>
+            </a:r>
+          </a:p>
+          <a:p>
+            <a:pPr lvl="1"/>
+            <a:r>
+              <a:rPr lang="en-US"/>
+              <a:t>Second level</a:t>
+            </a:r>
+          </a:p>
+          <a:p>
+            <a:pPr lvl="2"/>
+            <a:r>
+              <a:rPr lang="en-US"/>
+              <a:t>Third level</a:t>
+            </a:r>
+          </a:p>
+          <a:p>
+            <a:pPr lvl="3"/>
+            <a:r>
+              <a:rPr lang="en-US"/>
+              <a:t>Fourth level</a:t>
+            </a:r>
+          </a:p>
+          <a:p>
+            <a:pPr lvl="4"/>
+            <a:r>
+              <a:rPr lang="en-US"/>
+              <a:t>Fifth level</a:t>
+            </a:r>
+          </a:p>
+        </p:txBody>
+      </p:sp>
+    </p:spTree>
+    <p:extLst>
+      <p:ext uri="{BB962C8B-B14F-4D97-AF65-F5344CB8AC3E}">
+        <p14:creationId xmlns:p14="http://schemas.microsoft.com/office/powerpoint/2010/main" val="3485771766"/>
+      </p:ext>
+    </p:extLst>
+  </p:cSld>
+  <p:clrMapOvr>
+    <a:masterClrMapping/>
+  </p:clrMapOvr>
+</p:sldLayout>
+</file>
+
+<file path=ppt/slideLayouts/slideLayout9.xml><?xml version="1.0" encoding="utf-8"?>
 <p:sldLayout xmlns:a="http://schemas.openxmlformats.org/drawingml/2006/main" xmlns:r="http://schemas.openxmlformats.org/officeDocument/2006/relationships" xmlns:p="http://schemas.openxmlformats.org/presentationml/2006/main" preserve="1" userDrawn="1">
   <p:cSld name="Two Content and Caption Right">
     <p:bg>
@@ -4751,7 +5429,7 @@
           <a:p>
             <a:fld id="{82863D6F-CADA-4CBB-9BC8-C824FEFDF3AA}" type="datetime1">
               <a:rPr lang="en-US" smtClean="0"/>
-              <a:t>1/7/2022</a:t>
+              <a:t>5/16/2022</a:t>
             </a:fld>
             <a:endParaRPr lang="en-US"/>
           </a:p>
@@ -5068,380 +5746,6 @@
     <p:extLst>
       <p:ext uri="{BB962C8B-B14F-4D97-AF65-F5344CB8AC3E}">
         <p14:creationId xmlns:p14="http://schemas.microsoft.com/office/powerpoint/2010/main" val="3584477701"/>
-      </p:ext>
-    </p:extLst>
-  </p:cSld>
-  <p:clrMapOvr>
-    <a:masterClrMapping/>
-  </p:clrMapOvr>
-</p:sldLayout>
-</file>
-
-<file path=ppt/slideLayouts/slideLayout9.xml><?xml version="1.0" encoding="utf-8"?>
-<p:sldLayout xmlns:a="http://schemas.openxmlformats.org/drawingml/2006/main" xmlns:r="http://schemas.openxmlformats.org/officeDocument/2006/relationships" xmlns:p="http://schemas.openxmlformats.org/presentationml/2006/main" preserve="1" userDrawn="1">
-  <p:cSld name="Two Content and Caption Left">
-    <p:bg>
-      <p:bgPr>
-        <a:solidFill>
-          <a:schemeClr val="bg1"/>
-        </a:solidFill>
-        <a:effectLst/>
-      </p:bgPr>
-    </p:bg>
-    <p:spTree>
-      <p:nvGrpSpPr>
-        <p:cNvPr id="1" name=""/>
-        <p:cNvGrpSpPr/>
-        <p:nvPr/>
-      </p:nvGrpSpPr>
-      <p:grpSpPr>
-        <a:xfrm>
-          <a:off x="0" y="0"/>
-          <a:ext cx="0" cy="0"/>
-          <a:chOff x="0" y="0"/>
-          <a:chExt cx="0" cy="0"/>
-        </a:xfrm>
-      </p:grpSpPr>
-      <p:sp>
-        <p:nvSpPr>
-          <p:cNvPr id="5" name="Date Placeholder 4">
-            <a:extLst>
-              <a:ext uri="{FF2B5EF4-FFF2-40B4-BE49-F238E27FC236}">
-                <a16:creationId xmlns:a16="http://schemas.microsoft.com/office/drawing/2014/main" id="{985F3433-3055-4279-A232-CDB35C481677}"/>
-              </a:ext>
-            </a:extLst>
-          </p:cNvPr>
-          <p:cNvSpPr>
-            <a:spLocks noGrp="1"/>
-          </p:cNvSpPr>
-          <p:nvPr>
-            <p:ph type="dt" sz="half" idx="10"/>
-          </p:nvPr>
-        </p:nvSpPr>
-        <p:spPr/>
-        <p:txBody>
-          <a:bodyPr/>
-          <a:lstStyle/>
-          <a:p>
-            <a:fld id="{37F291A6-8F2B-4188-87A0-8AB8D22BFD0F}" type="datetime1">
-              <a:rPr lang="en-US" smtClean="0"/>
-              <a:t>1/7/2022</a:t>
-            </a:fld>
-            <a:endParaRPr lang="en-US"/>
-          </a:p>
-        </p:txBody>
-      </p:sp>
-      <p:sp>
-        <p:nvSpPr>
-          <p:cNvPr id="6" name="Footer Placeholder 5">
-            <a:extLst>
-              <a:ext uri="{FF2B5EF4-FFF2-40B4-BE49-F238E27FC236}">
-                <a16:creationId xmlns:a16="http://schemas.microsoft.com/office/drawing/2014/main" id="{C4190A63-5D67-4FD5-97FD-79F7445B6A2E}"/>
-              </a:ext>
-            </a:extLst>
-          </p:cNvPr>
-          <p:cNvSpPr>
-            <a:spLocks noGrp="1"/>
-          </p:cNvSpPr>
-          <p:nvPr>
-            <p:ph type="ftr" sz="quarter" idx="11"/>
-          </p:nvPr>
-        </p:nvSpPr>
-        <p:spPr/>
-        <p:txBody>
-          <a:bodyPr/>
-          <a:lstStyle/>
-          <a:p>
-            <a:endParaRPr lang="en-US"/>
-          </a:p>
-        </p:txBody>
-      </p:sp>
-      <p:sp>
-        <p:nvSpPr>
-          <p:cNvPr id="7" name="Slide Number Placeholder 6">
-            <a:extLst>
-              <a:ext uri="{FF2B5EF4-FFF2-40B4-BE49-F238E27FC236}">
-                <a16:creationId xmlns:a16="http://schemas.microsoft.com/office/drawing/2014/main" id="{D2687DAE-A442-4DC3-8550-20F58B781EC7}"/>
-              </a:ext>
-            </a:extLst>
-          </p:cNvPr>
-          <p:cNvSpPr>
-            <a:spLocks noGrp="1"/>
-          </p:cNvSpPr>
-          <p:nvPr>
-            <p:ph type="sldNum" sz="quarter" idx="12"/>
-          </p:nvPr>
-        </p:nvSpPr>
-        <p:spPr/>
-        <p:txBody>
-          <a:bodyPr/>
-          <a:lstStyle/>
-          <a:p>
-            <a:fld id="{C064A79B-B315-413E-88BB-EFE0B5D603D0}" type="slidenum">
-              <a:rPr lang="en-US" smtClean="0"/>
-              <a:t>‹#›</a:t>
-            </a:fld>
-            <a:endParaRPr lang="en-US"/>
-          </a:p>
-        </p:txBody>
-      </p:sp>
-      <p:sp>
-        <p:nvSpPr>
-          <p:cNvPr id="9" name="Title 1">
-            <a:extLst>
-              <a:ext uri="{FF2B5EF4-FFF2-40B4-BE49-F238E27FC236}">
-                <a16:creationId xmlns:a16="http://schemas.microsoft.com/office/drawing/2014/main" id="{177E17F1-D3B2-42A6-9982-8788655386CF}"/>
-              </a:ext>
-            </a:extLst>
-          </p:cNvPr>
-          <p:cNvSpPr>
-            <a:spLocks noGrp="1"/>
-          </p:cNvSpPr>
-          <p:nvPr>
-            <p:ph type="title"/>
-          </p:nvPr>
-        </p:nvSpPr>
-        <p:spPr>
-          <a:xfrm>
-            <a:off x="0" y="0"/>
-            <a:ext cx="12192000" cy="1013635"/>
-          </a:xfrm>
-          <a:solidFill>
-            <a:srgbClr val="0070C0"/>
-          </a:solidFill>
-        </p:spPr>
-        <p:txBody>
-          <a:bodyPr/>
-          <a:lstStyle>
-            <a:lvl1pPr>
-              <a:defRPr lang="en-US" dirty="0"/>
-            </a:lvl1pPr>
-          </a:lstStyle>
-          <a:p>
-            <a:r>
-              <a:rPr lang="en-US" dirty="0"/>
-              <a:t>Click to edit Master title style</a:t>
-            </a:r>
-          </a:p>
-        </p:txBody>
-      </p:sp>
-      <p:sp>
-        <p:nvSpPr>
-          <p:cNvPr id="10" name="Content Placeholder 2">
-            <a:extLst>
-              <a:ext uri="{FF2B5EF4-FFF2-40B4-BE49-F238E27FC236}">
-                <a16:creationId xmlns:a16="http://schemas.microsoft.com/office/drawing/2014/main" id="{F1A58CC4-526C-4991-898F-C0879D5343E8}"/>
-              </a:ext>
-            </a:extLst>
-          </p:cNvPr>
-          <p:cNvSpPr>
-            <a:spLocks noGrp="1"/>
-          </p:cNvSpPr>
-          <p:nvPr>
-            <p:ph sz="half" idx="1"/>
-          </p:nvPr>
-        </p:nvSpPr>
-        <p:spPr>
-          <a:xfrm>
-            <a:off x="250521" y="1205547"/>
-            <a:ext cx="5769279" cy="4446906"/>
-          </a:xfrm>
-        </p:spPr>
-        <p:txBody>
-          <a:bodyPr/>
-          <a:lstStyle/>
-          <a:p>
-            <a:pPr lvl="0"/>
-            <a:r>
-              <a:rPr lang="en-US"/>
-              <a:t>Click to edit Master text styles</a:t>
-            </a:r>
-          </a:p>
-          <a:p>
-            <a:pPr lvl="1"/>
-            <a:r>
-              <a:rPr lang="en-US"/>
-              <a:t>Second level</a:t>
-            </a:r>
-          </a:p>
-          <a:p>
-            <a:pPr lvl="2"/>
-            <a:r>
-              <a:rPr lang="en-US"/>
-              <a:t>Third level</a:t>
-            </a:r>
-          </a:p>
-          <a:p>
-            <a:pPr lvl="3"/>
-            <a:r>
-              <a:rPr lang="en-US"/>
-              <a:t>Fourth level</a:t>
-            </a:r>
-          </a:p>
-          <a:p>
-            <a:pPr lvl="4"/>
-            <a:r>
-              <a:rPr lang="en-US"/>
-              <a:t>Fifth level</a:t>
-            </a:r>
-          </a:p>
-        </p:txBody>
-      </p:sp>
-      <p:sp>
-        <p:nvSpPr>
-          <p:cNvPr id="11" name="Content Placeholder 3">
-            <a:extLst>
-              <a:ext uri="{FF2B5EF4-FFF2-40B4-BE49-F238E27FC236}">
-                <a16:creationId xmlns:a16="http://schemas.microsoft.com/office/drawing/2014/main" id="{CB008E43-F727-4C47-9855-9440A412ACCB}"/>
-              </a:ext>
-            </a:extLst>
-          </p:cNvPr>
-          <p:cNvSpPr>
-            <a:spLocks noGrp="1"/>
-          </p:cNvSpPr>
-          <p:nvPr>
-            <p:ph sz="half" idx="2"/>
-          </p:nvPr>
-        </p:nvSpPr>
-        <p:spPr>
-          <a:xfrm>
-            <a:off x="6172199" y="1205548"/>
-            <a:ext cx="5727527" cy="5021670"/>
-          </a:xfrm>
-        </p:spPr>
-        <p:txBody>
-          <a:bodyPr/>
-          <a:lstStyle/>
-          <a:p>
-            <a:pPr lvl="0"/>
-            <a:r>
-              <a:rPr lang="en-US"/>
-              <a:t>Click to edit Master text styles</a:t>
-            </a:r>
-          </a:p>
-          <a:p>
-            <a:pPr lvl="1"/>
-            <a:r>
-              <a:rPr lang="en-US"/>
-              <a:t>Second level</a:t>
-            </a:r>
-          </a:p>
-          <a:p>
-            <a:pPr lvl="2"/>
-            <a:r>
-              <a:rPr lang="en-US"/>
-              <a:t>Third level</a:t>
-            </a:r>
-          </a:p>
-          <a:p>
-            <a:pPr lvl="3"/>
-            <a:r>
-              <a:rPr lang="en-US"/>
-              <a:t>Fourth level</a:t>
-            </a:r>
-          </a:p>
-          <a:p>
-            <a:pPr lvl="4"/>
-            <a:r>
-              <a:rPr lang="en-US"/>
-              <a:t>Fifth level</a:t>
-            </a:r>
-          </a:p>
-        </p:txBody>
-      </p:sp>
-      <p:sp>
-        <p:nvSpPr>
-          <p:cNvPr id="3" name="Text Placeholder 2">
-            <a:extLst>
-              <a:ext uri="{FF2B5EF4-FFF2-40B4-BE49-F238E27FC236}">
-                <a16:creationId xmlns:a16="http://schemas.microsoft.com/office/drawing/2014/main" id="{B6810FF5-0B9C-4441-B73D-B10146FB8996}"/>
-              </a:ext>
-            </a:extLst>
-          </p:cNvPr>
-          <p:cNvSpPr>
-            <a:spLocks noGrp="1"/>
-          </p:cNvSpPr>
-          <p:nvPr>
-            <p:ph type="body" sz="quarter" idx="13"/>
-          </p:nvPr>
-        </p:nvSpPr>
-        <p:spPr>
-          <a:xfrm>
-            <a:off x="250521" y="5781584"/>
-            <a:ext cx="5769279" cy="445634"/>
-          </a:xfrm>
-        </p:spPr>
-        <p:txBody>
-          <a:bodyPr/>
-          <a:lstStyle>
-            <a:lvl1pPr marL="0" indent="0">
-              <a:buFont typeface="Arial" panose="020B0604020202020204" pitchFamily="34" charset="0"/>
-              <a:buNone/>
-              <a:defRPr sz="1200"/>
-            </a:lvl1pPr>
-            <a:lvl2pPr marL="457200" indent="0">
-              <a:buFont typeface="Arial" panose="020B0604020202020204" pitchFamily="34" charset="0"/>
-              <a:buNone/>
-              <a:defRPr sz="1100"/>
-            </a:lvl2pPr>
-            <a:lvl3pPr marL="914400" indent="0">
-              <a:buFont typeface="Arial" panose="020B0604020202020204" pitchFamily="34" charset="0"/>
-              <a:buNone/>
-              <a:defRPr sz="1050"/>
-            </a:lvl3pPr>
-            <a:lvl4pPr marL="1371600" indent="0">
-              <a:buFont typeface="Arial" panose="020B0604020202020204" pitchFamily="34" charset="0"/>
-              <a:buNone/>
-              <a:defRPr sz="1000"/>
-            </a:lvl4pPr>
-            <a:lvl5pPr marL="1828800" indent="0">
-              <a:buFont typeface="Arial" panose="020B0604020202020204" pitchFamily="34" charset="0"/>
-              <a:buNone/>
-              <a:defRPr sz="1000"/>
-            </a:lvl5pPr>
-          </a:lstStyle>
-          <a:p>
-            <a:pPr lvl="0"/>
-            <a:r>
-              <a:rPr lang="en-US" dirty="0"/>
-              <a:t>Click to edit Master text styles</a:t>
-            </a:r>
-          </a:p>
-          <a:p>
-            <a:pPr lvl="1"/>
-            <a:r>
-              <a:rPr lang="en-US" dirty="0"/>
-              <a:t>Second level</a:t>
-            </a:r>
-          </a:p>
-          <a:p>
-            <a:pPr lvl="2"/>
-            <a:r>
-              <a:rPr lang="en-US" dirty="0"/>
-              <a:t>Third level</a:t>
-            </a:r>
-          </a:p>
-          <a:p>
-            <a:pPr lvl="3"/>
-            <a:r>
-              <a:rPr lang="en-US" dirty="0"/>
-              <a:t>Fourth level</a:t>
-            </a:r>
-          </a:p>
-          <a:p>
-            <a:pPr lvl="4"/>
-            <a:r>
-              <a:rPr lang="en-US" dirty="0"/>
-              <a:t>Fifth level</a:t>
-            </a:r>
-            <a:endParaRPr lang="en-CH" dirty="0"/>
-          </a:p>
-        </p:txBody>
-      </p:sp>
-    </p:spTree>
-    <p:extLst>
-      <p:ext uri="{BB962C8B-B14F-4D97-AF65-F5344CB8AC3E}">
-        <p14:creationId xmlns:p14="http://schemas.microsoft.com/office/powerpoint/2010/main" val="3059227006"/>
       </p:ext>
     </p:extLst>
   </p:cSld>
@@ -5625,7 +5929,7 @@
           <a:p>
             <a:fld id="{A6955ACC-A649-4413-919F-39E0D17FFCDE}" type="datetime1">
               <a:rPr lang="en-US" smtClean="0"/>
-              <a:t>1/7/2022</a:t>
+              <a:t>5/16/2022</a:t>
             </a:fld>
             <a:endParaRPr lang="en-US"/>
           </a:p>
@@ -5736,7 +6040,7 @@
           <p:nvPr userDrawn="1"/>
         </p:nvPicPr>
         <p:blipFill rotWithShape="1">
-          <a:blip r:embed="rId19"/>
+          <a:blip r:embed="rId20"/>
           <a:srcRect l="10942" t="14424" r="10940" b="34605"/>
           <a:stretch/>
         </p:blipFill>
@@ -5766,16 +6070,17 @@
     <p:sldLayoutId id="2147483665" r:id="rId5"/>
     <p:sldLayoutId id="2147483651" r:id="rId6"/>
     <p:sldLayoutId id="2147483652" r:id="rId7"/>
-    <p:sldLayoutId id="2147483661" r:id="rId8"/>
-    <p:sldLayoutId id="2147483662" r:id="rId9"/>
-    <p:sldLayoutId id="2147483663" r:id="rId10"/>
-    <p:sldLayoutId id="2147483653" r:id="rId11"/>
-    <p:sldLayoutId id="2147483654" r:id="rId12"/>
-    <p:sldLayoutId id="2147483655" r:id="rId13"/>
-    <p:sldLayoutId id="2147483656" r:id="rId14"/>
-    <p:sldLayoutId id="2147483657" r:id="rId15"/>
-    <p:sldLayoutId id="2147483658" r:id="rId16"/>
-    <p:sldLayoutId id="2147483659" r:id="rId17"/>
+    <p:sldLayoutId id="2147483666" r:id="rId8"/>
+    <p:sldLayoutId id="2147483661" r:id="rId9"/>
+    <p:sldLayoutId id="2147483662" r:id="rId10"/>
+    <p:sldLayoutId id="2147483663" r:id="rId11"/>
+    <p:sldLayoutId id="2147483653" r:id="rId12"/>
+    <p:sldLayoutId id="2147483654" r:id="rId13"/>
+    <p:sldLayoutId id="2147483655" r:id="rId14"/>
+    <p:sldLayoutId id="2147483656" r:id="rId15"/>
+    <p:sldLayoutId id="2147483657" r:id="rId16"/>
+    <p:sldLayoutId id="2147483658" r:id="rId17"/>
+    <p:sldLayoutId id="2147483659" r:id="rId18"/>
   </p:sldLayoutIdLst>
   <p:hf hdr="0" dt="0"/>
   <p:txStyles>

</xml_diff>

<commit_message>
Two Content Right Bigger with better font sizes
</commit_message>
<xml_diff>
--- a/inst/templates/TemplateIQ_169.pptx
+++ b/inst/templates/TemplateIQ_169.pptx
@@ -5254,19 +5254,19 @@
             <a:normAutofit/>
           </a:bodyPr>
           <a:lstStyle>
-            <a:lvl1pPr>
+            <a:lvl1pPr marL="200025" indent="-200025">
               <a:defRPr sz="1600"/>
             </a:lvl1pPr>
-            <a:lvl2pPr>
+            <a:lvl2pPr marL="657225" indent="-200025">
               <a:defRPr sz="1400"/>
             </a:lvl2pPr>
-            <a:lvl3pPr>
+            <a:lvl3pPr marL="1112838" indent="-198438">
               <a:defRPr sz="1200"/>
             </a:lvl3pPr>
-            <a:lvl4pPr>
+            <a:lvl4pPr marL="1576388" indent="-204788">
               <a:defRPr sz="1100"/>
             </a:lvl4pPr>
-            <a:lvl5pPr>
+            <a:lvl5pPr marL="2028825" indent="-200025">
               <a:defRPr sz="1100"/>
             </a:lvl5pPr>
           </a:lstStyle>
@@ -6115,9 +6115,9 @@
         <a:buClr>
           <a:srgbClr val="0070C0"/>
         </a:buClr>
-        <a:buSzPct val="110000"/>
-        <a:buFont typeface="Arial" panose="020B0604020202020204" pitchFamily="34" charset="0"/>
-        <a:buChar char="•"/>
+        <a:buSzPct val="100000"/>
+        <a:buFont typeface="Wingdings" panose="05000000000000000000" pitchFamily="2" charset="2"/>
+        <a:buChar char="§"/>
         <a:defRPr sz="2000" kern="1200">
           <a:solidFill>
             <a:schemeClr val="tx1"/>
@@ -6137,9 +6137,9 @@
         <a:buClr>
           <a:srgbClr val="0070C0"/>
         </a:buClr>
-        <a:buSzPct val="110000"/>
-        <a:buFont typeface="Arial" panose="020B0604020202020204" pitchFamily="34" charset="0"/>
-        <a:buChar char="•"/>
+        <a:buSzPct val="100000"/>
+        <a:buFont typeface="Wingdings" panose="05000000000000000000" pitchFamily="2" charset="2"/>
+        <a:buChar char="§"/>
         <a:defRPr sz="1800" kern="1200">
           <a:solidFill>
             <a:schemeClr val="tx1"/>
@@ -6159,9 +6159,9 @@
         <a:buClr>
           <a:srgbClr val="0070C0"/>
         </a:buClr>
-        <a:buSzPct val="110000"/>
-        <a:buFont typeface="Arial" panose="020B0604020202020204" pitchFamily="34" charset="0"/>
-        <a:buChar char="•"/>
+        <a:buSzPct val="100000"/>
+        <a:buFont typeface="Wingdings" panose="05000000000000000000" pitchFamily="2" charset="2"/>
+        <a:buChar char="§"/>
         <a:defRPr sz="1600" kern="1200">
           <a:solidFill>
             <a:schemeClr val="tx1"/>
@@ -6181,9 +6181,9 @@
         <a:buClr>
           <a:srgbClr val="0070C0"/>
         </a:buClr>
-        <a:buSzPct val="110000"/>
-        <a:buFont typeface="Arial" panose="020B0604020202020204" pitchFamily="34" charset="0"/>
-        <a:buChar char="•"/>
+        <a:buSzPct val="100000"/>
+        <a:buFont typeface="Wingdings" panose="05000000000000000000" pitchFamily="2" charset="2"/>
+        <a:buChar char="§"/>
         <a:defRPr sz="1400" kern="1200">
           <a:solidFill>
             <a:schemeClr val="tx1"/>
@@ -6203,9 +6203,9 @@
         <a:buClr>
           <a:srgbClr val="0070C0"/>
         </a:buClr>
-        <a:buSzPct val="110000"/>
-        <a:buFont typeface="Arial" panose="020B0604020202020204" pitchFamily="34" charset="0"/>
-        <a:buChar char="•"/>
+        <a:buSzPct val="100000"/>
+        <a:buFont typeface="Wingdings" panose="05000000000000000000" pitchFamily="2" charset="2"/>
+        <a:buChar char="§"/>
         <a:defRPr sz="1400" kern="1200">
           <a:solidFill>
             <a:schemeClr val="tx1"/>

</xml_diff>